<commit_message>
fix: adjust some infos.
</commit_message>
<xml_diff>
--- a/src/dsrdiffusion/thinks.pptx
+++ b/src/dsrdiffusion/thinks.pptx
@@ -6,12 +6,19 @@
   </p:sldMasterIdLst>
   <p:sldIdLst>
     <p:sldId id="256" r:id="rId3"/>
-    <p:sldId id="257" r:id="rId4"/>
+    <p:sldId id="261" r:id="rId4"/>
+    <p:sldId id="262" r:id="rId5"/>
+    <p:sldId id="263" r:id="rId6"/>
+    <p:sldId id="260" r:id="rId7"/>
+    <p:sldId id="264" r:id="rId8"/>
+    <p:sldId id="259" r:id="rId9"/>
+    <p:sldId id="257" r:id="rId10"/>
+    <p:sldId id="258" r:id="rId11"/>
   </p:sldIdLst>
   <p:sldSz cx="12192000" cy="6858000"/>
   <p:notesSz cx="6858000" cy="9144000"/>
   <p:custDataLst>
-    <p:tags r:id="rId8"/>
+    <p:tags r:id="rId15"/>
   </p:custDataLst>
   <p:defaultTextStyle>
     <a:defPPr>
@@ -3015,67 +3022,91 @@
                       <a:endParaRPr lang="zh-CN" altLang="en-US"/>
                     </a:p>
                   </a:txBody>
-                  <a:tcPr anchor="ctr" anchorCtr="0"/>
-                </a:tc>
-                <a:tc>
-                  <a:txBody>
-                    <a:bodyPr/>
-                    <a:p>
-                      <a:pPr algn="ctr">
-                        <a:buNone/>
-                      </a:pPr>
-                      <a:endParaRPr lang="zh-CN" altLang="en-US"/>
-                    </a:p>
-                  </a:txBody>
-                  <a:tcPr anchor="ctr" anchorCtr="0"/>
-                </a:tc>
-                <a:tc>
-                  <a:txBody>
-                    <a:bodyPr/>
-                    <a:p>
-                      <a:pPr algn="ctr">
-                        <a:buNone/>
-                      </a:pPr>
-                      <a:endParaRPr lang="zh-CN" altLang="en-US"/>
-                    </a:p>
-                  </a:txBody>
-                  <a:tcPr anchor="ctr" anchorCtr="0"/>
-                </a:tc>
-                <a:tc>
-                  <a:txBody>
-                    <a:bodyPr/>
-                    <a:p>
-                      <a:pPr algn="ctr">
-                        <a:buNone/>
-                      </a:pPr>
-                      <a:endParaRPr lang="zh-CN" altLang="en-US"/>
-                    </a:p>
-                  </a:txBody>
-                  <a:tcPr anchor="ctr" anchorCtr="0"/>
-                </a:tc>
-                <a:tc>
-                  <a:txBody>
-                    <a:bodyPr/>
-                    <a:p>
-                      <a:pPr algn="ctr">
-                        <a:buNone/>
-                      </a:pPr>
-                      <a:endParaRPr lang="zh-CN" altLang="en-US"/>
-                    </a:p>
-                  </a:txBody>
-                  <a:tcPr anchor="ctr" anchorCtr="0"/>
-                </a:tc>
-                <a:tc>
-                  <a:txBody>
-                    <a:bodyPr/>
-                    <a:p>
-                      <a:pPr algn="ctr">
-                        <a:buNone/>
-                      </a:pPr>
-                      <a:endParaRPr lang="zh-CN" altLang="en-US"/>
-                    </a:p>
-                  </a:txBody>
-                  <a:tcPr anchor="ctr" anchorCtr="0"/>
+                  <a:tcPr anchor="ctr" anchorCtr="0">
+                    <a:solidFill>
+                      <a:schemeClr val="tx2"/>
+                    </a:solidFill>
+                  </a:tcPr>
+                </a:tc>
+                <a:tc>
+                  <a:txBody>
+                    <a:bodyPr/>
+                    <a:p>
+                      <a:pPr algn="ctr">
+                        <a:buNone/>
+                      </a:pPr>
+                      <a:endParaRPr lang="zh-CN" altLang="en-US"/>
+                    </a:p>
+                  </a:txBody>
+                  <a:tcPr anchor="ctr" anchorCtr="0">
+                    <a:solidFill>
+                      <a:schemeClr val="tx2"/>
+                    </a:solidFill>
+                  </a:tcPr>
+                </a:tc>
+                <a:tc>
+                  <a:txBody>
+                    <a:bodyPr/>
+                    <a:p>
+                      <a:pPr algn="ctr">
+                        <a:buNone/>
+                      </a:pPr>
+                      <a:endParaRPr lang="zh-CN" altLang="en-US"/>
+                    </a:p>
+                  </a:txBody>
+                  <a:tcPr anchor="ctr" anchorCtr="0">
+                    <a:solidFill>
+                      <a:schemeClr val="tx2"/>
+                    </a:solidFill>
+                  </a:tcPr>
+                </a:tc>
+                <a:tc>
+                  <a:txBody>
+                    <a:bodyPr/>
+                    <a:p>
+                      <a:pPr algn="ctr">
+                        <a:buNone/>
+                      </a:pPr>
+                      <a:endParaRPr lang="zh-CN" altLang="en-US"/>
+                    </a:p>
+                  </a:txBody>
+                  <a:tcPr anchor="ctr" anchorCtr="0">
+                    <a:solidFill>
+                      <a:schemeClr val="tx2"/>
+                    </a:solidFill>
+                  </a:tcPr>
+                </a:tc>
+                <a:tc>
+                  <a:txBody>
+                    <a:bodyPr/>
+                    <a:p>
+                      <a:pPr algn="ctr">
+                        <a:buNone/>
+                      </a:pPr>
+                      <a:endParaRPr lang="zh-CN" altLang="en-US"/>
+                    </a:p>
+                  </a:txBody>
+                  <a:tcPr anchor="ctr" anchorCtr="0">
+                    <a:solidFill>
+                      <a:schemeClr val="tx2"/>
+                    </a:solidFill>
+                  </a:tcPr>
+                </a:tc>
+                <a:tc>
+                  <a:txBody>
+                    <a:bodyPr/>
+                    <a:p>
+                      <a:pPr algn="ctr">
+                        <a:buNone/>
+                      </a:pPr>
+                      <a:endParaRPr lang="zh-CN" altLang="en-US"/>
+                    </a:p>
+                  </a:txBody>
+                  <a:tcPr anchor="ctr" anchorCtr="0">
+                    <a:solidFill>
+                      <a:schemeClr val="tx2"/>
+                    </a:solidFill>
+                  </a:tcPr>
                 </a:tc>
               </a:tr>
               <a:tr h="1014730">
@@ -3111,30 +3142,29 @@
                       <a:endParaRPr lang="zh-CN" altLang="en-US"/>
                     </a:p>
                   </a:txBody>
-                  <a:tcPr anchor="ctr" anchorCtr="0"/>
-                </a:tc>
-                <a:tc>
-                  <a:txBody>
-                    <a:bodyPr/>
-                    <a:p>
-                      <a:pPr algn="ctr">
-                        <a:buNone/>
-                      </a:pPr>
-                      <a:endParaRPr lang="zh-CN" altLang="en-US"/>
-                    </a:p>
-                  </a:txBody>
-                  <a:tcPr anchor="ctr" anchorCtr="0"/>
-                </a:tc>
-                <a:tc>
-                  <a:txBody>
-                    <a:bodyPr/>
-                    <a:p>
-                      <a:pPr algn="ctr">
-                        <a:buNone/>
-                      </a:pPr>
-                      <a:endParaRPr lang="zh-CN" altLang="en-US"/>
-                    </a:p>
-                  </a:txBody>
+                  <a:tcPr anchor="ctr" anchorCtr="0">
+                    <a:solidFill>
+                      <a:schemeClr val="accent1"/>
+                    </a:solidFill>
+                  </a:tcPr>
+                </a:tc>
+                <a:tc rowSpan="5" gridSpan="2">
+                  <a:txBody>
+                    <a:bodyPr/>
+                    <a:p>
+                      <a:pPr algn="ctr">
+                        <a:buNone/>
+                      </a:pPr>
+                      <a:endParaRPr lang="zh-CN" altLang="en-US"/>
+                    </a:p>
+                  </a:txBody>
+                  <a:tcPr anchor="ctr" anchorCtr="0">
+                    <a:solidFill>
+                      <a:schemeClr val="accent1"/>
+                    </a:solidFill>
+                  </a:tcPr>
+                </a:tc>
+                <a:tc rowSpan="5" hMerge="1">
                   <a:tcPr anchor="ctr" anchorCtr="0"/>
                 </a:tc>
               </a:tr>
@@ -3162,30 +3192,19 @@
                       <a:endParaRPr lang="zh-CN" altLang="en-US"/>
                     </a:p>
                   </a:txBody>
+                  <a:tcPr anchor="ctr" anchorCtr="0">
+                    <a:solidFill>
+                      <a:schemeClr val="accent5">
+                        <a:lumMod val="20000"/>
+                        <a:lumOff val="80000"/>
+                      </a:schemeClr>
+                    </a:solidFill>
+                  </a:tcPr>
+                </a:tc>
+                <a:tc vMerge="1" gridSpan="2">
                   <a:tcPr anchor="ctr" anchorCtr="0"/>
                 </a:tc>
-                <a:tc>
-                  <a:txBody>
-                    <a:bodyPr/>
-                    <a:p>
-                      <a:pPr algn="ctr">
-                        <a:buNone/>
-                      </a:pPr>
-                      <a:endParaRPr lang="zh-CN" altLang="en-US"/>
-                    </a:p>
-                  </a:txBody>
-                  <a:tcPr anchor="ctr" anchorCtr="0"/>
-                </a:tc>
-                <a:tc>
-                  <a:txBody>
-                    <a:bodyPr/>
-                    <a:p>
-                      <a:pPr algn="ctr">
-                        <a:buNone/>
-                      </a:pPr>
-                      <a:endParaRPr lang="zh-CN" altLang="en-US"/>
-                    </a:p>
-                  </a:txBody>
+                <a:tc vMerge="1" hMerge="1">
                   <a:tcPr anchor="ctr" anchorCtr="0"/>
                 </a:tc>
               </a:tr>
@@ -3213,30 +3232,19 @@
                       <a:endParaRPr lang="zh-CN" altLang="en-US"/>
                     </a:p>
                   </a:txBody>
+                  <a:tcPr anchor="ctr" anchorCtr="0">
+                    <a:solidFill>
+                      <a:schemeClr val="accent5">
+                        <a:lumMod val="20000"/>
+                        <a:lumOff val="80000"/>
+                      </a:schemeClr>
+                    </a:solidFill>
+                  </a:tcPr>
+                </a:tc>
+                <a:tc vMerge="1" gridSpan="2">
                   <a:tcPr anchor="ctr" anchorCtr="0"/>
                 </a:tc>
-                <a:tc>
-                  <a:txBody>
-                    <a:bodyPr/>
-                    <a:p>
-                      <a:pPr algn="ctr">
-                        <a:buNone/>
-                      </a:pPr>
-                      <a:endParaRPr lang="zh-CN" altLang="en-US"/>
-                    </a:p>
-                  </a:txBody>
-                  <a:tcPr anchor="ctr" anchorCtr="0"/>
-                </a:tc>
-                <a:tc>
-                  <a:txBody>
-                    <a:bodyPr/>
-                    <a:p>
-                      <a:pPr algn="ctr">
-                        <a:buNone/>
-                      </a:pPr>
-                      <a:endParaRPr lang="zh-CN" altLang="en-US"/>
-                    </a:p>
-                  </a:txBody>
+                <a:tc vMerge="1" hMerge="1">
                   <a:tcPr anchor="ctr" anchorCtr="0"/>
                 </a:tc>
               </a:tr>
@@ -3264,30 +3272,19 @@
                       <a:endParaRPr lang="zh-CN" altLang="en-US"/>
                     </a:p>
                   </a:txBody>
+                  <a:tcPr anchor="ctr" anchorCtr="0">
+                    <a:solidFill>
+                      <a:schemeClr val="accent5">
+                        <a:lumMod val="20000"/>
+                        <a:lumOff val="80000"/>
+                      </a:schemeClr>
+                    </a:solidFill>
+                  </a:tcPr>
+                </a:tc>
+                <a:tc vMerge="1" gridSpan="2">
                   <a:tcPr anchor="ctr" anchorCtr="0"/>
                 </a:tc>
-                <a:tc>
-                  <a:txBody>
-                    <a:bodyPr/>
-                    <a:p>
-                      <a:pPr algn="ctr">
-                        <a:buNone/>
-                      </a:pPr>
-                      <a:endParaRPr lang="zh-CN" altLang="en-US"/>
-                    </a:p>
-                  </a:txBody>
-                  <a:tcPr anchor="ctr" anchorCtr="0"/>
-                </a:tc>
-                <a:tc>
-                  <a:txBody>
-                    <a:bodyPr/>
-                    <a:p>
-                      <a:pPr algn="ctr">
-                        <a:buNone/>
-                      </a:pPr>
-                      <a:endParaRPr lang="zh-CN" altLang="en-US"/>
-                    </a:p>
-                  </a:txBody>
+                <a:tc vMerge="1" hMerge="1">
                   <a:tcPr anchor="ctr" anchorCtr="0"/>
                 </a:tc>
               </a:tr>
@@ -3308,33 +3305,26 @@
                       <a:pPr algn="ctr">
                         <a:buNone/>
                       </a:pPr>
-                      <a:endParaRPr lang="zh-CN" altLang="en-US"/>
-                    </a:p>
-                  </a:txBody>
+                      <a:r>
+                        <a:rPr lang="zh-CN" altLang="en-US"/>
+                        <a:t>灯光</a:t>
+                      </a:r>
+                      <a:endParaRPr lang="zh-CN" altLang="en-US"/>
+                    </a:p>
+                  </a:txBody>
+                  <a:tcPr anchor="ctr" anchorCtr="0">
+                    <a:solidFill>
+                      <a:schemeClr val="accent5">
+                        <a:lumMod val="20000"/>
+                        <a:lumOff val="80000"/>
+                      </a:schemeClr>
+                    </a:solidFill>
+                  </a:tcPr>
+                </a:tc>
+                <a:tc vMerge="1" gridSpan="2">
                   <a:tcPr anchor="ctr" anchorCtr="0"/>
                 </a:tc>
-                <a:tc>
-                  <a:txBody>
-                    <a:bodyPr/>
-                    <a:p>
-                      <a:pPr algn="ctr">
-                        <a:buNone/>
-                      </a:pPr>
-                      <a:endParaRPr lang="zh-CN" altLang="en-US"/>
-                    </a:p>
-                  </a:txBody>
-                  <a:tcPr anchor="ctr" anchorCtr="0"/>
-                </a:tc>
-                <a:tc>
-                  <a:txBody>
-                    <a:bodyPr/>
-                    <a:p>
-                      <a:pPr algn="ctr">
-                        <a:buNone/>
-                      </a:pPr>
-                      <a:endParaRPr lang="zh-CN" altLang="en-US"/>
-                    </a:p>
-                  </a:txBody>
+                <a:tc vMerge="1" hMerge="1">
                   <a:tcPr anchor="ctr" anchorCtr="0"/>
                 </a:tc>
               </a:tr>
@@ -3342,6 +3332,4019 @@
           </a:graphicData>
         </a:graphic>
       </p:graphicFrame>
+      <p:pic>
+        <p:nvPicPr>
+          <p:cNvPr id="2" name="图片 1"/>
+          <p:cNvPicPr>
+            <a:picLocks noChangeAspect="1"/>
+          </p:cNvPicPr>
+          <p:nvPr>
+            <p:custDataLst>
+              <p:tags r:id="rId2"/>
+            </p:custDataLst>
+          </p:nvPr>
+        </p:nvPicPr>
+        <p:blipFill>
+          <a:blip r:embed="rId3"/>
+          <a:stretch>
+            <a:fillRect/>
+          </a:stretch>
+        </p:blipFill>
+        <p:spPr>
+          <a:xfrm>
+            <a:off x="996950" y="1576070"/>
+            <a:ext cx="4773930" cy="4718050"/>
+          </a:xfrm>
+          <a:prstGeom prst="rect">
+            <a:avLst/>
+          </a:prstGeom>
+          <a:effectLst>
+            <a:softEdge rad="50800"/>
+          </a:effectLst>
+        </p:spPr>
+      </p:pic>
+      <p:sp>
+        <p:nvSpPr>
+          <p:cNvPr id="3" name="文本框 2"/>
+          <p:cNvSpPr txBox="1"/>
+          <p:nvPr/>
+        </p:nvSpPr>
+        <p:spPr>
+          <a:xfrm>
+            <a:off x="8107045" y="2157095"/>
+            <a:ext cx="3142615" cy="384175"/>
+          </a:xfrm>
+          <a:prstGeom prst="rect">
+            <a:avLst/>
+          </a:prstGeom>
+          <a:solidFill>
+            <a:schemeClr val="accent1">
+              <a:lumMod val="75000"/>
+            </a:schemeClr>
+          </a:solidFill>
+          <a:ln>
+            <a:noFill/>
+          </a:ln>
+        </p:spPr>
+        <p:txBody>
+          <a:bodyPr wrap="square" rtlCol="0">
+            <a:noAutofit/>
+          </a:bodyPr>
+          <a:p>
+            <a:r>
+              <a:rPr lang="zh-CN" altLang="en-US" sz="1600">
+                <a:ln>
+                  <a:noFill/>
+                </a:ln>
+                <a:solidFill>
+                  <a:schemeClr val="bg1"/>
+                </a:solidFill>
+              </a:rPr>
+              <a:t>图像宽</a:t>
+            </a:r>
+            <a:r>
+              <a:rPr lang="en-US" altLang="zh-CN" sz="1600">
+                <a:ln>
+                  <a:noFill/>
+                </a:ln>
+                <a:solidFill>
+                  <a:schemeClr val="bg1"/>
+                </a:solidFill>
+              </a:rPr>
+              <a:t>         :                   800</a:t>
+            </a:r>
+            <a:endParaRPr lang="en-US" altLang="zh-CN" sz="1600">
+              <a:ln>
+                <a:noFill/>
+              </a:ln>
+              <a:solidFill>
+                <a:schemeClr val="bg1"/>
+              </a:solidFill>
+            </a:endParaRPr>
+          </a:p>
+        </p:txBody>
+      </p:sp>
+      <p:sp>
+        <p:nvSpPr>
+          <p:cNvPr id="4" name="文本框 3"/>
+          <p:cNvSpPr txBox="1"/>
+          <p:nvPr/>
+        </p:nvSpPr>
+        <p:spPr>
+          <a:xfrm>
+            <a:off x="8107045" y="2750185"/>
+            <a:ext cx="3142615" cy="384175"/>
+          </a:xfrm>
+          <a:prstGeom prst="rect">
+            <a:avLst/>
+          </a:prstGeom>
+          <a:solidFill>
+            <a:schemeClr val="accent1">
+              <a:lumMod val="75000"/>
+            </a:schemeClr>
+          </a:solidFill>
+          <a:ln>
+            <a:noFill/>
+          </a:ln>
+        </p:spPr>
+        <p:txBody>
+          <a:bodyPr wrap="square" rtlCol="0">
+            <a:noAutofit/>
+          </a:bodyPr>
+          <a:p>
+            <a:r>
+              <a:rPr lang="zh-CN" altLang="en-US" sz="1600">
+                <a:ln>
+                  <a:noFill/>
+                </a:ln>
+                <a:solidFill>
+                  <a:schemeClr val="bg1"/>
+                </a:solidFill>
+              </a:rPr>
+              <a:t>图像高</a:t>
+            </a:r>
+            <a:r>
+              <a:rPr lang="en-US" altLang="zh-CN" sz="1600">
+                <a:ln>
+                  <a:noFill/>
+                </a:ln>
+                <a:solidFill>
+                  <a:schemeClr val="bg1"/>
+                </a:solidFill>
+              </a:rPr>
+              <a:t>         :                   600</a:t>
+            </a:r>
+            <a:endParaRPr lang="en-US" altLang="zh-CN" sz="1600">
+              <a:ln>
+                <a:noFill/>
+              </a:ln>
+              <a:solidFill>
+                <a:schemeClr val="bg1"/>
+              </a:solidFill>
+            </a:endParaRPr>
+          </a:p>
+        </p:txBody>
+      </p:sp>
+      <p:sp>
+        <p:nvSpPr>
+          <p:cNvPr id="8" name="文本框 7"/>
+          <p:cNvSpPr txBox="1"/>
+          <p:nvPr/>
+        </p:nvSpPr>
+        <p:spPr>
+          <a:xfrm>
+            <a:off x="8107045" y="3343275"/>
+            <a:ext cx="3142615" cy="384175"/>
+          </a:xfrm>
+          <a:prstGeom prst="rect">
+            <a:avLst/>
+          </a:prstGeom>
+          <a:solidFill>
+            <a:schemeClr val="accent1">
+              <a:lumMod val="75000"/>
+            </a:schemeClr>
+          </a:solidFill>
+          <a:ln>
+            <a:noFill/>
+          </a:ln>
+        </p:spPr>
+        <p:txBody>
+          <a:bodyPr wrap="square" rtlCol="0">
+            <a:noAutofit/>
+          </a:bodyPr>
+          <a:p>
+            <a:r>
+              <a:rPr lang="zh-CN" altLang="en-US" sz="1600">
+                <a:ln>
+                  <a:noFill/>
+                </a:ln>
+                <a:solidFill>
+                  <a:schemeClr val="bg1"/>
+                </a:solidFill>
+              </a:rPr>
+              <a:t>背景透明</a:t>
+            </a:r>
+            <a:r>
+              <a:rPr lang="en-US" altLang="zh-CN" sz="1600">
+                <a:ln>
+                  <a:noFill/>
+                </a:ln>
+                <a:solidFill>
+                  <a:schemeClr val="bg1"/>
+                </a:solidFill>
+              </a:rPr>
+              <a:t>     :                 </a:t>
+            </a:r>
+            <a:r>
+              <a:rPr lang="zh-CN" altLang="en-US" sz="1600">
+                <a:ln>
+                  <a:noFill/>
+                </a:ln>
+                <a:solidFill>
+                  <a:schemeClr val="bg1"/>
+                </a:solidFill>
+              </a:rPr>
+              <a:t>是</a:t>
+            </a:r>
+            <a:r>
+              <a:rPr lang="en-US" altLang="zh-CN" sz="1600">
+                <a:ln>
+                  <a:noFill/>
+                </a:ln>
+                <a:solidFill>
+                  <a:schemeClr val="bg1"/>
+                </a:solidFill>
+              </a:rPr>
+              <a:t>/</a:t>
+            </a:r>
+            <a:r>
+              <a:rPr lang="zh-CN" altLang="en-US" sz="1600">
+                <a:ln>
+                  <a:noFill/>
+                </a:ln>
+                <a:solidFill>
+                  <a:schemeClr val="bg1"/>
+                </a:solidFill>
+              </a:rPr>
+              <a:t>否</a:t>
+            </a:r>
+            <a:endParaRPr lang="zh-CN" altLang="en-US" sz="1600">
+              <a:ln>
+                <a:noFill/>
+              </a:ln>
+              <a:solidFill>
+                <a:schemeClr val="bg1"/>
+              </a:solidFill>
+            </a:endParaRPr>
+          </a:p>
+        </p:txBody>
+      </p:sp>
+      <p:sp>
+        <p:nvSpPr>
+          <p:cNvPr id="9" name="文本框 8"/>
+          <p:cNvSpPr txBox="1"/>
+          <p:nvPr/>
+        </p:nvSpPr>
+        <p:spPr>
+          <a:xfrm>
+            <a:off x="8107045" y="3936365"/>
+            <a:ext cx="3142615" cy="384175"/>
+          </a:xfrm>
+          <a:prstGeom prst="rect">
+            <a:avLst/>
+          </a:prstGeom>
+          <a:solidFill>
+            <a:schemeClr val="accent1">
+              <a:lumMod val="75000"/>
+            </a:schemeClr>
+          </a:solidFill>
+          <a:ln>
+            <a:noFill/>
+          </a:ln>
+        </p:spPr>
+        <p:txBody>
+          <a:bodyPr wrap="square" rtlCol="0">
+            <a:noAutofit/>
+          </a:bodyPr>
+          <a:p>
+            <a:r>
+              <a:rPr lang="zh-CN" altLang="en-US" sz="1600">
+                <a:ln>
+                  <a:noFill/>
+                </a:ln>
+                <a:solidFill>
+                  <a:schemeClr val="bg1"/>
+                </a:solidFill>
+              </a:rPr>
+              <a:t>出图类型</a:t>
+            </a:r>
+            <a:r>
+              <a:rPr lang="en-US" altLang="zh-CN" sz="1600">
+                <a:ln>
+                  <a:noFill/>
+                </a:ln>
+                <a:solidFill>
+                  <a:schemeClr val="bg1"/>
+                </a:solidFill>
+              </a:rPr>
+              <a:t>     :  </a:t>
+            </a:r>
+            <a:r>
+              <a:rPr lang="zh-CN" sz="1600">
+                <a:ln>
+                  <a:noFill/>
+                </a:ln>
+                <a:solidFill>
+                  <a:schemeClr val="bg1"/>
+                </a:solidFill>
+              </a:rPr>
+              <a:t>单图</a:t>
+            </a:r>
+            <a:r>
+              <a:rPr lang="en-US" altLang="zh-CN" sz="1600">
+                <a:ln>
+                  <a:noFill/>
+                </a:ln>
+                <a:solidFill>
+                  <a:schemeClr val="bg1"/>
+                </a:solidFill>
+              </a:rPr>
+              <a:t>/</a:t>
+            </a:r>
+            <a:r>
+              <a:rPr lang="zh-CN" altLang="en-US" sz="1600">
+                <a:ln>
+                  <a:noFill/>
+                </a:ln>
+                <a:solidFill>
+                  <a:schemeClr val="bg1"/>
+                </a:solidFill>
+              </a:rPr>
+              <a:t>天空盒</a:t>
+            </a:r>
+            <a:r>
+              <a:rPr lang="en-US" altLang="zh-CN" sz="1600">
+                <a:ln>
+                  <a:noFill/>
+                </a:ln>
+                <a:solidFill>
+                  <a:schemeClr val="bg1"/>
+                </a:solidFill>
+              </a:rPr>
+              <a:t>/</a:t>
+            </a:r>
+            <a:r>
+              <a:rPr lang="zh-CN" altLang="en-US" sz="1600">
+                <a:ln>
+                  <a:noFill/>
+                </a:ln>
+                <a:solidFill>
+                  <a:schemeClr val="bg1"/>
+                </a:solidFill>
+              </a:rPr>
+              <a:t>视频</a:t>
+            </a:r>
+            <a:endParaRPr lang="zh-CN" altLang="en-US" sz="1600">
+              <a:ln>
+                <a:noFill/>
+              </a:ln>
+              <a:solidFill>
+                <a:schemeClr val="bg1"/>
+              </a:solidFill>
+            </a:endParaRPr>
+          </a:p>
+        </p:txBody>
+      </p:sp>
+      <p:sp>
+        <p:nvSpPr>
+          <p:cNvPr id="10" name="文本框 9"/>
+          <p:cNvSpPr txBox="1"/>
+          <p:nvPr>
+            <p:custDataLst>
+              <p:tags r:id="rId4"/>
+            </p:custDataLst>
+          </p:nvPr>
+        </p:nvSpPr>
+        <p:spPr>
+          <a:xfrm>
+            <a:off x="8107045" y="4529455"/>
+            <a:ext cx="3142615" cy="384175"/>
+          </a:xfrm>
+          <a:prstGeom prst="rect">
+            <a:avLst/>
+          </a:prstGeom>
+          <a:solidFill>
+            <a:schemeClr val="accent1">
+              <a:lumMod val="75000"/>
+            </a:schemeClr>
+          </a:solidFill>
+          <a:ln>
+            <a:noFill/>
+          </a:ln>
+        </p:spPr>
+        <p:txBody>
+          <a:bodyPr wrap="square" rtlCol="0">
+            <a:noAutofit/>
+          </a:bodyPr>
+          <a:p>
+            <a:r>
+              <a:rPr lang="zh-CN" altLang="en-US" sz="1600">
+                <a:ln>
+                  <a:noFill/>
+                </a:ln>
+                <a:solidFill>
+                  <a:schemeClr val="bg1"/>
+                </a:solidFill>
+              </a:rPr>
+              <a:t>背景色</a:t>
+            </a:r>
+            <a:r>
+              <a:rPr lang="en-US" altLang="zh-CN" sz="1600">
+                <a:ln>
+                  <a:noFill/>
+                </a:ln>
+                <a:solidFill>
+                  <a:schemeClr val="bg1"/>
+                </a:solidFill>
+              </a:rPr>
+              <a:t>            :            0XFFFFFF</a:t>
+            </a:r>
+            <a:endParaRPr lang="zh-CN" altLang="en-US" sz="1600">
+              <a:ln>
+                <a:noFill/>
+              </a:ln>
+              <a:solidFill>
+                <a:schemeClr val="bg1"/>
+              </a:solidFill>
+            </a:endParaRPr>
+          </a:p>
+        </p:txBody>
+      </p:sp>
+    </p:spTree>
+  </p:cSld>
+  <p:clrMapOvr>
+    <a:masterClrMapping/>
+  </p:clrMapOvr>
+</p:sld>
+</file>
+
+<file path=ppt/slides/slide3.xml><?xml version="1.0" encoding="utf-8"?>
+<p:sld xmlns:a="http://schemas.openxmlformats.org/drawingml/2006/main" xmlns:r="http://schemas.openxmlformats.org/officeDocument/2006/relationships" xmlns:p="http://schemas.openxmlformats.org/presentationml/2006/main">
+  <p:cSld>
+    <p:spTree>
+      <p:nvGrpSpPr>
+        <p:cNvPr id="1" name=""/>
+        <p:cNvGrpSpPr/>
+        <p:nvPr/>
+      </p:nvGrpSpPr>
+      <p:grpSpPr/>
+      <p:graphicFrame>
+        <p:nvGraphicFramePr>
+          <p:cNvPr id="5" name="表格 4"/>
+          <p:cNvGraphicFramePr/>
+          <p:nvPr>
+            <p:custDataLst>
+              <p:tags r:id="rId1"/>
+            </p:custDataLst>
+          </p:nvPr>
+        </p:nvGraphicFramePr>
+        <p:xfrm>
+          <a:off x="708660" y="384810"/>
+          <a:ext cx="10774680" cy="6088380"/>
+        </p:xfrm>
+        <a:graphic>
+          <a:graphicData uri="http://schemas.openxmlformats.org/drawingml/2006/table">
+            <a:tbl>
+              <a:tblPr firstRow="1" bandRow="1">
+                <a:tableStyleId>{5C22544A-7EE6-4342-B048-85BDC9FD1C3A}</a:tableStyleId>
+              </a:tblPr>
+              <a:tblGrid>
+                <a:gridCol w="1795780"/>
+                <a:gridCol w="1795780"/>
+                <a:gridCol w="1795780"/>
+                <a:gridCol w="1795780"/>
+                <a:gridCol w="1795780"/>
+                <a:gridCol w="1795780"/>
+              </a:tblGrid>
+              <a:tr h="1014730">
+                <a:tc>
+                  <a:txBody>
+                    <a:bodyPr/>
+                    <a:p>
+                      <a:pPr algn="ctr">
+                        <a:buNone/>
+                      </a:pPr>
+                      <a:endParaRPr lang="zh-CN" altLang="en-US"/>
+                    </a:p>
+                  </a:txBody>
+                  <a:tcPr anchor="ctr" anchorCtr="0">
+                    <a:solidFill>
+                      <a:schemeClr val="tx2"/>
+                    </a:solidFill>
+                  </a:tcPr>
+                </a:tc>
+                <a:tc>
+                  <a:txBody>
+                    <a:bodyPr/>
+                    <a:p>
+                      <a:pPr algn="ctr">
+                        <a:buNone/>
+                      </a:pPr>
+                      <a:endParaRPr lang="zh-CN" altLang="en-US"/>
+                    </a:p>
+                  </a:txBody>
+                  <a:tcPr anchor="ctr" anchorCtr="0">
+                    <a:solidFill>
+                      <a:schemeClr val="tx2"/>
+                    </a:solidFill>
+                  </a:tcPr>
+                </a:tc>
+                <a:tc>
+                  <a:txBody>
+                    <a:bodyPr/>
+                    <a:p>
+                      <a:pPr algn="ctr">
+                        <a:buNone/>
+                      </a:pPr>
+                      <a:endParaRPr lang="zh-CN" altLang="en-US"/>
+                    </a:p>
+                  </a:txBody>
+                  <a:tcPr anchor="ctr" anchorCtr="0">
+                    <a:solidFill>
+                      <a:schemeClr val="tx2"/>
+                    </a:solidFill>
+                  </a:tcPr>
+                </a:tc>
+                <a:tc>
+                  <a:txBody>
+                    <a:bodyPr/>
+                    <a:p>
+                      <a:pPr algn="ctr">
+                        <a:buNone/>
+                      </a:pPr>
+                      <a:endParaRPr lang="zh-CN" altLang="en-US"/>
+                    </a:p>
+                  </a:txBody>
+                  <a:tcPr anchor="ctr" anchorCtr="0">
+                    <a:solidFill>
+                      <a:schemeClr val="tx2"/>
+                    </a:solidFill>
+                  </a:tcPr>
+                </a:tc>
+                <a:tc>
+                  <a:txBody>
+                    <a:bodyPr/>
+                    <a:p>
+                      <a:pPr algn="ctr">
+                        <a:buNone/>
+                      </a:pPr>
+                      <a:endParaRPr lang="zh-CN" altLang="en-US"/>
+                    </a:p>
+                  </a:txBody>
+                  <a:tcPr anchor="ctr" anchorCtr="0">
+                    <a:solidFill>
+                      <a:schemeClr val="tx2"/>
+                    </a:solidFill>
+                  </a:tcPr>
+                </a:tc>
+                <a:tc>
+                  <a:txBody>
+                    <a:bodyPr/>
+                    <a:p>
+                      <a:pPr algn="ctr">
+                        <a:buNone/>
+                      </a:pPr>
+                      <a:endParaRPr lang="zh-CN" altLang="en-US"/>
+                    </a:p>
+                  </a:txBody>
+                  <a:tcPr anchor="ctr" anchorCtr="0">
+                    <a:solidFill>
+                      <a:schemeClr val="tx2"/>
+                    </a:solidFill>
+                  </a:tcPr>
+                </a:tc>
+              </a:tr>
+              <a:tr h="1014730">
+                <a:tc rowSpan="5" gridSpan="3">
+                  <a:txBody>
+                    <a:bodyPr/>
+                    <a:p>
+                      <a:pPr algn="ctr">
+                        <a:buNone/>
+                      </a:pPr>
+                      <a:endParaRPr lang="zh-CN" altLang="en-US"/>
+                    </a:p>
+                  </a:txBody>
+                  <a:tcPr anchor="ctr" anchorCtr="0"/>
+                </a:tc>
+                <a:tc rowSpan="5" hMerge="1">
+                  <a:tcPr/>
+                </a:tc>
+                <a:tc rowSpan="5" hMerge="1">
+                  <a:tcPr/>
+                </a:tc>
+                <a:tc>
+                  <a:txBody>
+                    <a:bodyPr/>
+                    <a:p>
+                      <a:pPr algn="ctr">
+                        <a:buNone/>
+                      </a:pPr>
+                      <a:r>
+                        <a:rPr lang="zh-CN" altLang="en-US"/>
+                        <a:t>出图设置</a:t>
+                      </a:r>
+                      <a:endParaRPr lang="zh-CN" altLang="en-US"/>
+                    </a:p>
+                  </a:txBody>
+                  <a:tcPr anchor="ctr" anchorCtr="0">
+                    <a:solidFill>
+                      <a:schemeClr val="accent5">
+                        <a:lumMod val="20000"/>
+                        <a:lumOff val="80000"/>
+                      </a:schemeClr>
+                    </a:solidFill>
+                  </a:tcPr>
+                </a:tc>
+                <a:tc rowSpan="5" gridSpan="2">
+                  <a:txBody>
+                    <a:bodyPr/>
+                    <a:p>
+                      <a:pPr algn="ctr">
+                        <a:buNone/>
+                      </a:pPr>
+                      <a:endParaRPr lang="zh-CN" altLang="en-US"/>
+                    </a:p>
+                  </a:txBody>
+                  <a:tcPr anchor="ctr" anchorCtr="0">
+                    <a:solidFill>
+                      <a:schemeClr val="accent1"/>
+                    </a:solidFill>
+                  </a:tcPr>
+                </a:tc>
+                <a:tc rowSpan="5" hMerge="1">
+                  <a:tcPr anchor="ctr" anchorCtr="0"/>
+                </a:tc>
+              </a:tr>
+              <a:tr h="1014730">
+                <a:tc vMerge="1" gridSpan="3">
+                  <a:tcPr/>
+                </a:tc>
+                <a:tc vMerge="1" hMerge="1">
+                  <a:tcPr/>
+                </a:tc>
+                <a:tc vMerge="1" hMerge="1">
+                  <a:tcPr/>
+                </a:tc>
+                <a:tc>
+                  <a:txBody>
+                    <a:bodyPr/>
+                    <a:p>
+                      <a:pPr algn="ctr">
+                        <a:buNone/>
+                      </a:pPr>
+                      <a:r>
+                        <a:rPr lang="zh-CN" altLang="en-US"/>
+                        <a:t>环境设置</a:t>
+                      </a:r>
+                      <a:endParaRPr lang="zh-CN" altLang="en-US"/>
+                    </a:p>
+                  </a:txBody>
+                  <a:tcPr anchor="ctr" anchorCtr="0">
+                    <a:solidFill>
+                      <a:schemeClr val="accent1"/>
+                    </a:solidFill>
+                  </a:tcPr>
+                </a:tc>
+                <a:tc vMerge="1" gridSpan="2">
+                  <a:tcPr anchor="ctr" anchorCtr="0"/>
+                </a:tc>
+                <a:tc vMerge="1" hMerge="1">
+                  <a:tcPr anchor="ctr" anchorCtr="0"/>
+                </a:tc>
+              </a:tr>
+              <a:tr h="1014730">
+                <a:tc vMerge="1" gridSpan="3">
+                  <a:tcPr/>
+                </a:tc>
+                <a:tc vMerge="1" hMerge="1">
+                  <a:tcPr/>
+                </a:tc>
+                <a:tc vMerge="1" hMerge="1">
+                  <a:tcPr/>
+                </a:tc>
+                <a:tc>
+                  <a:txBody>
+                    <a:bodyPr/>
+                    <a:p>
+                      <a:pPr algn="ctr">
+                        <a:buNone/>
+                      </a:pPr>
+                      <a:r>
+                        <a:rPr lang="zh-CN" altLang="en-US"/>
+                        <a:t>摄像机</a:t>
+                      </a:r>
+                      <a:endParaRPr lang="zh-CN" altLang="en-US"/>
+                    </a:p>
+                  </a:txBody>
+                  <a:tcPr anchor="ctr" anchorCtr="0">
+                    <a:solidFill>
+                      <a:schemeClr val="accent5">
+                        <a:lumMod val="20000"/>
+                        <a:lumOff val="80000"/>
+                      </a:schemeClr>
+                    </a:solidFill>
+                  </a:tcPr>
+                </a:tc>
+                <a:tc vMerge="1" gridSpan="2">
+                  <a:tcPr anchor="ctr" anchorCtr="0"/>
+                </a:tc>
+                <a:tc vMerge="1" hMerge="1">
+                  <a:tcPr anchor="ctr" anchorCtr="0"/>
+                </a:tc>
+              </a:tr>
+              <a:tr h="1014730">
+                <a:tc vMerge="1" gridSpan="3">
+                  <a:tcPr/>
+                </a:tc>
+                <a:tc vMerge="1" hMerge="1">
+                  <a:tcPr/>
+                </a:tc>
+                <a:tc vMerge="1" hMerge="1">
+                  <a:tcPr/>
+                </a:tc>
+                <a:tc>
+                  <a:txBody>
+                    <a:bodyPr/>
+                    <a:p>
+                      <a:pPr algn="ctr">
+                        <a:buNone/>
+                      </a:pPr>
+                      <a:r>
+                        <a:rPr lang="zh-CN" altLang="en-US"/>
+                        <a:t>材质</a:t>
+                      </a:r>
+                      <a:endParaRPr lang="zh-CN" altLang="en-US"/>
+                    </a:p>
+                  </a:txBody>
+                  <a:tcPr anchor="ctr" anchorCtr="0">
+                    <a:solidFill>
+                      <a:schemeClr val="accent5">
+                        <a:lumMod val="20000"/>
+                        <a:lumOff val="80000"/>
+                      </a:schemeClr>
+                    </a:solidFill>
+                  </a:tcPr>
+                </a:tc>
+                <a:tc vMerge="1" gridSpan="2">
+                  <a:tcPr anchor="ctr" anchorCtr="0"/>
+                </a:tc>
+                <a:tc vMerge="1" hMerge="1">
+                  <a:tcPr anchor="ctr" anchorCtr="0"/>
+                </a:tc>
+              </a:tr>
+              <a:tr h="1014730">
+                <a:tc vMerge="1" gridSpan="3">
+                  <a:tcPr/>
+                </a:tc>
+                <a:tc vMerge="1" hMerge="1">
+                  <a:tcPr/>
+                </a:tc>
+                <a:tc vMerge="1" hMerge="1">
+                  <a:tcPr/>
+                </a:tc>
+                <a:tc>
+                  <a:txBody>
+                    <a:bodyPr/>
+                    <a:p>
+                      <a:pPr algn="ctr">
+                        <a:buNone/>
+                      </a:pPr>
+                      <a:r>
+                        <a:rPr lang="zh-CN" altLang="en-US"/>
+                        <a:t>灯光</a:t>
+                      </a:r>
+                      <a:endParaRPr lang="zh-CN" altLang="en-US"/>
+                    </a:p>
+                  </a:txBody>
+                  <a:tcPr anchor="ctr" anchorCtr="0">
+                    <a:solidFill>
+                      <a:schemeClr val="accent5">
+                        <a:lumMod val="20000"/>
+                        <a:lumOff val="80000"/>
+                      </a:schemeClr>
+                    </a:solidFill>
+                  </a:tcPr>
+                </a:tc>
+                <a:tc vMerge="1" gridSpan="2">
+                  <a:tcPr anchor="ctr" anchorCtr="0"/>
+                </a:tc>
+                <a:tc vMerge="1" hMerge="1">
+                  <a:tcPr anchor="ctr" anchorCtr="0"/>
+                </a:tc>
+              </a:tr>
+            </a:tbl>
+          </a:graphicData>
+        </a:graphic>
+      </p:graphicFrame>
+      <p:pic>
+        <p:nvPicPr>
+          <p:cNvPr id="2" name="图片 1"/>
+          <p:cNvPicPr>
+            <a:picLocks noChangeAspect="1"/>
+          </p:cNvPicPr>
+          <p:nvPr>
+            <p:custDataLst>
+              <p:tags r:id="rId2"/>
+            </p:custDataLst>
+          </p:nvPr>
+        </p:nvPicPr>
+        <p:blipFill>
+          <a:blip r:embed="rId3"/>
+          <a:stretch>
+            <a:fillRect/>
+          </a:stretch>
+        </p:blipFill>
+        <p:spPr>
+          <a:xfrm>
+            <a:off x="996950" y="1576070"/>
+            <a:ext cx="4773930" cy="4718050"/>
+          </a:xfrm>
+          <a:prstGeom prst="rect">
+            <a:avLst/>
+          </a:prstGeom>
+          <a:effectLst>
+            <a:softEdge rad="50800"/>
+          </a:effectLst>
+        </p:spPr>
+      </p:pic>
+      <p:sp>
+        <p:nvSpPr>
+          <p:cNvPr id="3" name="文本框 2"/>
+          <p:cNvSpPr txBox="1"/>
+          <p:nvPr/>
+        </p:nvSpPr>
+        <p:spPr>
+          <a:xfrm>
+            <a:off x="8107045" y="2157095"/>
+            <a:ext cx="3142615" cy="384175"/>
+          </a:xfrm>
+          <a:prstGeom prst="rect">
+            <a:avLst/>
+          </a:prstGeom>
+          <a:solidFill>
+            <a:schemeClr val="accent1">
+              <a:lumMod val="75000"/>
+            </a:schemeClr>
+          </a:solidFill>
+          <a:ln>
+            <a:noFill/>
+          </a:ln>
+        </p:spPr>
+        <p:txBody>
+          <a:bodyPr wrap="square" rtlCol="0">
+            <a:noAutofit/>
+          </a:bodyPr>
+          <a:p>
+            <a:r>
+              <a:rPr lang="zh-CN" altLang="en-US" sz="1600">
+                <a:ln>
+                  <a:noFill/>
+                </a:ln>
+                <a:solidFill>
+                  <a:schemeClr val="bg1"/>
+                </a:solidFill>
+              </a:rPr>
+              <a:t>环境选择</a:t>
+            </a:r>
+            <a:r>
+              <a:rPr lang="en-US" altLang="zh-CN" sz="1600">
+                <a:ln>
+                  <a:noFill/>
+                </a:ln>
+                <a:solidFill>
+                  <a:schemeClr val="bg1"/>
+                </a:solidFill>
+              </a:rPr>
+              <a:t>         :          </a:t>
+            </a:r>
+            <a:r>
+              <a:rPr lang="zh-CN" altLang="en-US" sz="1600">
+                <a:ln>
+                  <a:noFill/>
+                </a:ln>
+                <a:solidFill>
+                  <a:schemeClr val="bg1"/>
+                </a:solidFill>
+              </a:rPr>
+              <a:t>室内</a:t>
+            </a:r>
+            <a:r>
+              <a:rPr lang="en-US" altLang="zh-CN" sz="1600">
+                <a:ln>
+                  <a:noFill/>
+                </a:ln>
+                <a:solidFill>
+                  <a:schemeClr val="bg1"/>
+                </a:solidFill>
+              </a:rPr>
+              <a:t>/</a:t>
+            </a:r>
+            <a:r>
+              <a:rPr lang="zh-CN" altLang="en-US" sz="1600">
+                <a:ln>
+                  <a:noFill/>
+                </a:ln>
+                <a:solidFill>
+                  <a:schemeClr val="bg1"/>
+                </a:solidFill>
+              </a:rPr>
+              <a:t>广场</a:t>
+            </a:r>
+            <a:endParaRPr lang="zh-CN" altLang="en-US" sz="1600">
+              <a:ln>
+                <a:noFill/>
+              </a:ln>
+              <a:solidFill>
+                <a:schemeClr val="bg1"/>
+              </a:solidFill>
+            </a:endParaRPr>
+          </a:p>
+        </p:txBody>
+      </p:sp>
+      <p:sp>
+        <p:nvSpPr>
+          <p:cNvPr id="4" name="文本框 3"/>
+          <p:cNvSpPr txBox="1"/>
+          <p:nvPr/>
+        </p:nvSpPr>
+        <p:spPr>
+          <a:xfrm>
+            <a:off x="8107045" y="2775585"/>
+            <a:ext cx="3142615" cy="384175"/>
+          </a:xfrm>
+          <a:prstGeom prst="rect">
+            <a:avLst/>
+          </a:prstGeom>
+          <a:solidFill>
+            <a:schemeClr val="accent1">
+              <a:lumMod val="75000"/>
+            </a:schemeClr>
+          </a:solidFill>
+          <a:ln>
+            <a:noFill/>
+          </a:ln>
+        </p:spPr>
+        <p:txBody>
+          <a:bodyPr wrap="square" rtlCol="0">
+            <a:noAutofit/>
+          </a:bodyPr>
+          <a:p>
+            <a:r>
+              <a:rPr lang="zh-CN" altLang="en-US" sz="1600">
+                <a:ln>
+                  <a:noFill/>
+                </a:ln>
+                <a:solidFill>
+                  <a:schemeClr val="bg1"/>
+                </a:solidFill>
+              </a:rPr>
+              <a:t>亮度</a:t>
+            </a:r>
+            <a:r>
+              <a:rPr lang="en-US" altLang="zh-CN" sz="1600">
+                <a:ln>
+                  <a:noFill/>
+                </a:ln>
+                <a:solidFill>
+                  <a:schemeClr val="bg1"/>
+                </a:solidFill>
+              </a:rPr>
+              <a:t>                  :                0.7</a:t>
+            </a:r>
+            <a:endParaRPr lang="en-US" altLang="zh-CN" sz="1600">
+              <a:ln>
+                <a:noFill/>
+              </a:ln>
+              <a:solidFill>
+                <a:schemeClr val="bg1"/>
+              </a:solidFill>
+            </a:endParaRPr>
+          </a:p>
+        </p:txBody>
+      </p:sp>
+      <p:sp>
+        <p:nvSpPr>
+          <p:cNvPr id="8" name="文本框 7"/>
+          <p:cNvSpPr txBox="1"/>
+          <p:nvPr/>
+        </p:nvSpPr>
+        <p:spPr>
+          <a:xfrm>
+            <a:off x="8107045" y="3394075"/>
+            <a:ext cx="3142615" cy="384175"/>
+          </a:xfrm>
+          <a:prstGeom prst="rect">
+            <a:avLst/>
+          </a:prstGeom>
+          <a:solidFill>
+            <a:schemeClr val="accent1">
+              <a:lumMod val="75000"/>
+            </a:schemeClr>
+          </a:solidFill>
+          <a:ln>
+            <a:noFill/>
+          </a:ln>
+        </p:spPr>
+        <p:txBody>
+          <a:bodyPr wrap="square" rtlCol="0">
+            <a:noAutofit/>
+          </a:bodyPr>
+          <a:p>
+            <a:r>
+              <a:rPr lang="zh-CN" altLang="en-US" sz="1600">
+                <a:ln>
+                  <a:noFill/>
+                </a:ln>
+                <a:solidFill>
+                  <a:schemeClr val="bg1"/>
+                </a:solidFill>
+              </a:rPr>
+              <a:t>旋转</a:t>
+            </a:r>
+            <a:r>
+              <a:rPr lang="en-US" altLang="zh-CN" sz="1600">
+                <a:ln>
+                  <a:noFill/>
+                </a:ln>
+                <a:solidFill>
+                  <a:schemeClr val="bg1"/>
+                </a:solidFill>
+              </a:rPr>
+              <a:t>                  :             </a:t>
+            </a:r>
+            <a:r>
+              <a:rPr lang="zh-CN" altLang="en-US" sz="1600">
+                <a:ln>
+                  <a:noFill/>
+                </a:ln>
+                <a:solidFill>
+                  <a:schemeClr val="bg1"/>
+                </a:solidFill>
+              </a:rPr>
+              <a:t>是</a:t>
+            </a:r>
+            <a:r>
+              <a:rPr lang="en-US" altLang="zh-CN" sz="1600">
+                <a:ln>
+                  <a:noFill/>
+                </a:ln>
+                <a:solidFill>
+                  <a:schemeClr val="bg1"/>
+                </a:solidFill>
+              </a:rPr>
+              <a:t>/</a:t>
+            </a:r>
+            <a:r>
+              <a:rPr lang="zh-CN" altLang="en-US" sz="1600">
+                <a:ln>
+                  <a:noFill/>
+                </a:ln>
+                <a:solidFill>
+                  <a:schemeClr val="bg1"/>
+                </a:solidFill>
+              </a:rPr>
+              <a:t>否</a:t>
+            </a:r>
+            <a:endParaRPr lang="zh-CN" altLang="en-US" sz="1600">
+              <a:ln>
+                <a:noFill/>
+              </a:ln>
+              <a:solidFill>
+                <a:schemeClr val="bg1"/>
+              </a:solidFill>
+            </a:endParaRPr>
+          </a:p>
+        </p:txBody>
+      </p:sp>
+    </p:spTree>
+  </p:cSld>
+  <p:clrMapOvr>
+    <a:masterClrMapping/>
+  </p:clrMapOvr>
+</p:sld>
+</file>
+
+<file path=ppt/slides/slide4.xml><?xml version="1.0" encoding="utf-8"?>
+<p:sld xmlns:a="http://schemas.openxmlformats.org/drawingml/2006/main" xmlns:r="http://schemas.openxmlformats.org/officeDocument/2006/relationships" xmlns:p="http://schemas.openxmlformats.org/presentationml/2006/main">
+  <p:cSld>
+    <p:spTree>
+      <p:nvGrpSpPr>
+        <p:cNvPr id="1" name=""/>
+        <p:cNvGrpSpPr/>
+        <p:nvPr/>
+      </p:nvGrpSpPr>
+      <p:grpSpPr/>
+      <p:graphicFrame>
+        <p:nvGraphicFramePr>
+          <p:cNvPr id="5" name="表格 4"/>
+          <p:cNvGraphicFramePr/>
+          <p:nvPr>
+            <p:custDataLst>
+              <p:tags r:id="rId1"/>
+            </p:custDataLst>
+          </p:nvPr>
+        </p:nvGraphicFramePr>
+        <p:xfrm>
+          <a:off x="708660" y="384810"/>
+          <a:ext cx="10774680" cy="6088380"/>
+        </p:xfrm>
+        <a:graphic>
+          <a:graphicData uri="http://schemas.openxmlformats.org/drawingml/2006/table">
+            <a:tbl>
+              <a:tblPr firstRow="1" bandRow="1">
+                <a:tableStyleId>{5C22544A-7EE6-4342-B048-85BDC9FD1C3A}</a:tableStyleId>
+              </a:tblPr>
+              <a:tblGrid>
+                <a:gridCol w="1795780"/>
+                <a:gridCol w="1795780"/>
+                <a:gridCol w="1795780"/>
+                <a:gridCol w="1795780"/>
+                <a:gridCol w="1795780"/>
+                <a:gridCol w="1795780"/>
+              </a:tblGrid>
+              <a:tr h="1014730">
+                <a:tc>
+                  <a:txBody>
+                    <a:bodyPr/>
+                    <a:p>
+                      <a:pPr algn="ctr">
+                        <a:buNone/>
+                      </a:pPr>
+                      <a:endParaRPr lang="zh-CN" altLang="en-US"/>
+                    </a:p>
+                  </a:txBody>
+                  <a:tcPr anchor="ctr" anchorCtr="0">
+                    <a:solidFill>
+                      <a:schemeClr val="tx2"/>
+                    </a:solidFill>
+                  </a:tcPr>
+                </a:tc>
+                <a:tc>
+                  <a:txBody>
+                    <a:bodyPr/>
+                    <a:p>
+                      <a:pPr algn="ctr">
+                        <a:buNone/>
+                      </a:pPr>
+                      <a:endParaRPr lang="zh-CN" altLang="en-US"/>
+                    </a:p>
+                  </a:txBody>
+                  <a:tcPr anchor="ctr" anchorCtr="0">
+                    <a:solidFill>
+                      <a:schemeClr val="tx2"/>
+                    </a:solidFill>
+                  </a:tcPr>
+                </a:tc>
+                <a:tc>
+                  <a:txBody>
+                    <a:bodyPr/>
+                    <a:p>
+                      <a:pPr algn="ctr">
+                        <a:buNone/>
+                      </a:pPr>
+                      <a:endParaRPr lang="zh-CN" altLang="en-US"/>
+                    </a:p>
+                  </a:txBody>
+                  <a:tcPr anchor="ctr" anchorCtr="0">
+                    <a:solidFill>
+                      <a:schemeClr val="tx2"/>
+                    </a:solidFill>
+                  </a:tcPr>
+                </a:tc>
+                <a:tc>
+                  <a:txBody>
+                    <a:bodyPr/>
+                    <a:p>
+                      <a:pPr algn="ctr">
+                        <a:buNone/>
+                      </a:pPr>
+                      <a:endParaRPr lang="zh-CN" altLang="en-US"/>
+                    </a:p>
+                  </a:txBody>
+                  <a:tcPr anchor="ctr" anchorCtr="0">
+                    <a:solidFill>
+                      <a:schemeClr val="tx2"/>
+                    </a:solidFill>
+                  </a:tcPr>
+                </a:tc>
+                <a:tc>
+                  <a:txBody>
+                    <a:bodyPr/>
+                    <a:p>
+                      <a:pPr algn="ctr">
+                        <a:buNone/>
+                      </a:pPr>
+                      <a:endParaRPr lang="zh-CN" altLang="en-US"/>
+                    </a:p>
+                  </a:txBody>
+                  <a:tcPr anchor="ctr" anchorCtr="0">
+                    <a:solidFill>
+                      <a:schemeClr val="tx2"/>
+                    </a:solidFill>
+                  </a:tcPr>
+                </a:tc>
+                <a:tc>
+                  <a:txBody>
+                    <a:bodyPr/>
+                    <a:p>
+                      <a:pPr algn="ctr">
+                        <a:buNone/>
+                      </a:pPr>
+                      <a:endParaRPr lang="zh-CN" altLang="en-US"/>
+                    </a:p>
+                  </a:txBody>
+                  <a:tcPr anchor="ctr" anchorCtr="0">
+                    <a:solidFill>
+                      <a:schemeClr val="tx2"/>
+                    </a:solidFill>
+                  </a:tcPr>
+                </a:tc>
+              </a:tr>
+              <a:tr h="1014730">
+                <a:tc rowSpan="5" gridSpan="3">
+                  <a:txBody>
+                    <a:bodyPr/>
+                    <a:p>
+                      <a:pPr algn="ctr">
+                        <a:buNone/>
+                      </a:pPr>
+                      <a:endParaRPr lang="zh-CN" altLang="en-US"/>
+                    </a:p>
+                  </a:txBody>
+                  <a:tcPr anchor="ctr" anchorCtr="0"/>
+                </a:tc>
+                <a:tc rowSpan="5" hMerge="1">
+                  <a:tcPr/>
+                </a:tc>
+                <a:tc rowSpan="5" hMerge="1">
+                  <a:tcPr/>
+                </a:tc>
+                <a:tc>
+                  <a:txBody>
+                    <a:bodyPr/>
+                    <a:p>
+                      <a:pPr algn="ctr">
+                        <a:buNone/>
+                      </a:pPr>
+                      <a:r>
+                        <a:rPr lang="zh-CN" altLang="en-US"/>
+                        <a:t>出图设置</a:t>
+                      </a:r>
+                      <a:endParaRPr lang="zh-CN" altLang="en-US"/>
+                    </a:p>
+                  </a:txBody>
+                  <a:tcPr anchor="ctr" anchorCtr="0">
+                    <a:solidFill>
+                      <a:schemeClr val="accent5">
+                        <a:lumMod val="20000"/>
+                        <a:lumOff val="80000"/>
+                      </a:schemeClr>
+                    </a:solidFill>
+                  </a:tcPr>
+                </a:tc>
+                <a:tc rowSpan="5" gridSpan="2">
+                  <a:txBody>
+                    <a:bodyPr/>
+                    <a:p>
+                      <a:pPr algn="ctr">
+                        <a:buNone/>
+                      </a:pPr>
+                      <a:endParaRPr lang="zh-CN" altLang="en-US"/>
+                    </a:p>
+                  </a:txBody>
+                  <a:tcPr anchor="ctr" anchorCtr="0">
+                    <a:solidFill>
+                      <a:schemeClr val="accent1"/>
+                    </a:solidFill>
+                  </a:tcPr>
+                </a:tc>
+                <a:tc rowSpan="5" hMerge="1">
+                  <a:tcPr anchor="ctr" anchorCtr="0"/>
+                </a:tc>
+              </a:tr>
+              <a:tr h="1014730">
+                <a:tc vMerge="1" gridSpan="3">
+                  <a:tcPr/>
+                </a:tc>
+                <a:tc vMerge="1" hMerge="1">
+                  <a:tcPr/>
+                </a:tc>
+                <a:tc vMerge="1" hMerge="1">
+                  <a:tcPr/>
+                </a:tc>
+                <a:tc>
+                  <a:txBody>
+                    <a:bodyPr/>
+                    <a:p>
+                      <a:pPr algn="ctr">
+                        <a:buNone/>
+                      </a:pPr>
+                      <a:r>
+                        <a:rPr lang="zh-CN" altLang="en-US"/>
+                        <a:t>环境设置</a:t>
+                      </a:r>
+                      <a:endParaRPr lang="zh-CN" altLang="en-US"/>
+                    </a:p>
+                  </a:txBody>
+                  <a:tcPr anchor="ctr" anchorCtr="0">
+                    <a:solidFill>
+                      <a:schemeClr val="accent5">
+                        <a:lumMod val="20000"/>
+                        <a:lumOff val="80000"/>
+                      </a:schemeClr>
+                    </a:solidFill>
+                  </a:tcPr>
+                </a:tc>
+                <a:tc vMerge="1" gridSpan="2">
+                  <a:tcPr anchor="ctr" anchorCtr="0"/>
+                </a:tc>
+                <a:tc vMerge="1" hMerge="1">
+                  <a:tcPr anchor="ctr" anchorCtr="0"/>
+                </a:tc>
+              </a:tr>
+              <a:tr h="1014730">
+                <a:tc vMerge="1" gridSpan="3">
+                  <a:tcPr/>
+                </a:tc>
+                <a:tc vMerge="1" hMerge="1">
+                  <a:tcPr/>
+                </a:tc>
+                <a:tc vMerge="1" hMerge="1">
+                  <a:tcPr/>
+                </a:tc>
+                <a:tc>
+                  <a:txBody>
+                    <a:bodyPr/>
+                    <a:p>
+                      <a:pPr algn="ctr">
+                        <a:buNone/>
+                      </a:pPr>
+                      <a:r>
+                        <a:rPr lang="zh-CN" altLang="en-US"/>
+                        <a:t>摄像机</a:t>
+                      </a:r>
+                      <a:endParaRPr lang="zh-CN" altLang="en-US"/>
+                    </a:p>
+                  </a:txBody>
+                  <a:tcPr anchor="ctr" anchorCtr="0">
+                    <a:solidFill>
+                      <a:schemeClr val="accent1"/>
+                    </a:solidFill>
+                  </a:tcPr>
+                </a:tc>
+                <a:tc vMerge="1" gridSpan="2">
+                  <a:tcPr anchor="ctr" anchorCtr="0"/>
+                </a:tc>
+                <a:tc vMerge="1" hMerge="1">
+                  <a:tcPr anchor="ctr" anchorCtr="0"/>
+                </a:tc>
+              </a:tr>
+              <a:tr h="1014730">
+                <a:tc vMerge="1" gridSpan="3">
+                  <a:tcPr/>
+                </a:tc>
+                <a:tc vMerge="1" hMerge="1">
+                  <a:tcPr/>
+                </a:tc>
+                <a:tc vMerge="1" hMerge="1">
+                  <a:tcPr/>
+                </a:tc>
+                <a:tc>
+                  <a:txBody>
+                    <a:bodyPr/>
+                    <a:p>
+                      <a:pPr algn="ctr">
+                        <a:buNone/>
+                      </a:pPr>
+                      <a:r>
+                        <a:rPr lang="zh-CN" altLang="en-US"/>
+                        <a:t>材质</a:t>
+                      </a:r>
+                      <a:endParaRPr lang="zh-CN" altLang="en-US"/>
+                    </a:p>
+                  </a:txBody>
+                  <a:tcPr anchor="ctr" anchorCtr="0">
+                    <a:solidFill>
+                      <a:schemeClr val="accent5">
+                        <a:lumMod val="20000"/>
+                        <a:lumOff val="80000"/>
+                      </a:schemeClr>
+                    </a:solidFill>
+                  </a:tcPr>
+                </a:tc>
+                <a:tc vMerge="1" gridSpan="2">
+                  <a:tcPr anchor="ctr" anchorCtr="0"/>
+                </a:tc>
+                <a:tc vMerge="1" hMerge="1">
+                  <a:tcPr anchor="ctr" anchorCtr="0"/>
+                </a:tc>
+              </a:tr>
+              <a:tr h="1014730">
+                <a:tc vMerge="1" gridSpan="3">
+                  <a:tcPr/>
+                </a:tc>
+                <a:tc vMerge="1" hMerge="1">
+                  <a:tcPr/>
+                </a:tc>
+                <a:tc vMerge="1" hMerge="1">
+                  <a:tcPr/>
+                </a:tc>
+                <a:tc>
+                  <a:txBody>
+                    <a:bodyPr/>
+                    <a:p>
+                      <a:pPr algn="ctr">
+                        <a:buNone/>
+                      </a:pPr>
+                      <a:r>
+                        <a:rPr lang="zh-CN" altLang="en-US"/>
+                        <a:t>灯光</a:t>
+                      </a:r>
+                      <a:endParaRPr lang="zh-CN" altLang="en-US"/>
+                    </a:p>
+                  </a:txBody>
+                  <a:tcPr anchor="ctr" anchorCtr="0">
+                    <a:solidFill>
+                      <a:schemeClr val="accent5">
+                        <a:lumMod val="20000"/>
+                        <a:lumOff val="80000"/>
+                      </a:schemeClr>
+                    </a:solidFill>
+                  </a:tcPr>
+                </a:tc>
+                <a:tc vMerge="1" gridSpan="2">
+                  <a:tcPr anchor="ctr" anchorCtr="0"/>
+                </a:tc>
+                <a:tc vMerge="1" hMerge="1">
+                  <a:tcPr anchor="ctr" anchorCtr="0"/>
+                </a:tc>
+              </a:tr>
+            </a:tbl>
+          </a:graphicData>
+        </a:graphic>
+      </p:graphicFrame>
+      <p:pic>
+        <p:nvPicPr>
+          <p:cNvPr id="2" name="图片 1"/>
+          <p:cNvPicPr>
+            <a:picLocks noChangeAspect="1"/>
+          </p:cNvPicPr>
+          <p:nvPr>
+            <p:custDataLst>
+              <p:tags r:id="rId2"/>
+            </p:custDataLst>
+          </p:nvPr>
+        </p:nvPicPr>
+        <p:blipFill>
+          <a:blip r:embed="rId3"/>
+          <a:stretch>
+            <a:fillRect/>
+          </a:stretch>
+        </p:blipFill>
+        <p:spPr>
+          <a:xfrm>
+            <a:off x="996950" y="1576070"/>
+            <a:ext cx="4773930" cy="4718050"/>
+          </a:xfrm>
+          <a:prstGeom prst="rect">
+            <a:avLst/>
+          </a:prstGeom>
+          <a:effectLst>
+            <a:softEdge rad="50800"/>
+          </a:effectLst>
+        </p:spPr>
+      </p:pic>
+      <p:sp>
+        <p:nvSpPr>
+          <p:cNvPr id="3" name="文本框 2"/>
+          <p:cNvSpPr txBox="1"/>
+          <p:nvPr/>
+        </p:nvSpPr>
+        <p:spPr>
+          <a:xfrm>
+            <a:off x="8107045" y="2157095"/>
+            <a:ext cx="3142615" cy="384175"/>
+          </a:xfrm>
+          <a:prstGeom prst="rect">
+            <a:avLst/>
+          </a:prstGeom>
+          <a:solidFill>
+            <a:schemeClr val="accent1">
+              <a:lumMod val="75000"/>
+            </a:schemeClr>
+          </a:solidFill>
+          <a:ln>
+            <a:noFill/>
+          </a:ln>
+        </p:spPr>
+        <p:txBody>
+          <a:bodyPr wrap="square" rtlCol="0">
+            <a:noAutofit/>
+          </a:bodyPr>
+          <a:p>
+            <a:r>
+              <a:rPr lang="zh-CN" altLang="en-US" sz="1600">
+                <a:ln>
+                  <a:noFill/>
+                </a:ln>
+                <a:solidFill>
+                  <a:schemeClr val="bg1"/>
+                </a:solidFill>
+              </a:rPr>
+              <a:t>视角</a:t>
+            </a:r>
+            <a:r>
+              <a:rPr lang="en-US" altLang="zh-CN" sz="1600">
+                <a:ln>
+                  <a:noFill/>
+                </a:ln>
+                <a:solidFill>
+                  <a:schemeClr val="bg1"/>
+                </a:solidFill>
+              </a:rPr>
+              <a:t>                   :                </a:t>
+            </a:r>
+            <a:r>
+              <a:rPr lang="en-US" sz="1600">
+                <a:ln>
+                  <a:noFill/>
+                </a:ln>
+                <a:solidFill>
+                  <a:schemeClr val="bg1"/>
+                </a:solidFill>
+              </a:rPr>
+              <a:t>50.0</a:t>
+            </a:r>
+            <a:endParaRPr lang="en-US" sz="1600">
+              <a:ln>
+                <a:noFill/>
+              </a:ln>
+              <a:solidFill>
+                <a:schemeClr val="bg1"/>
+              </a:solidFill>
+            </a:endParaRPr>
+          </a:p>
+        </p:txBody>
+      </p:sp>
+      <p:sp>
+        <p:nvSpPr>
+          <p:cNvPr id="4" name="文本框 3"/>
+          <p:cNvSpPr txBox="1"/>
+          <p:nvPr/>
+        </p:nvSpPr>
+        <p:spPr>
+          <a:xfrm>
+            <a:off x="8107045" y="2775585"/>
+            <a:ext cx="3142615" cy="384175"/>
+          </a:xfrm>
+          <a:prstGeom prst="rect">
+            <a:avLst/>
+          </a:prstGeom>
+          <a:solidFill>
+            <a:schemeClr val="accent1">
+              <a:lumMod val="75000"/>
+            </a:schemeClr>
+          </a:solidFill>
+          <a:ln>
+            <a:noFill/>
+          </a:ln>
+        </p:spPr>
+        <p:txBody>
+          <a:bodyPr wrap="square" rtlCol="0">
+            <a:noAutofit/>
+          </a:bodyPr>
+          <a:p>
+            <a:r>
+              <a:rPr lang="zh-CN" altLang="en-US" sz="1600">
+                <a:ln>
+                  <a:noFill/>
+                </a:ln>
+                <a:solidFill>
+                  <a:schemeClr val="bg1"/>
+                </a:solidFill>
+              </a:rPr>
+              <a:t>近裁剪面</a:t>
+            </a:r>
+            <a:r>
+              <a:rPr lang="en-US" altLang="zh-CN" sz="1600">
+                <a:ln>
+                  <a:noFill/>
+                </a:ln>
+                <a:solidFill>
+                  <a:schemeClr val="bg1"/>
+                </a:solidFill>
+              </a:rPr>
+              <a:t>           :             10mm</a:t>
+            </a:r>
+            <a:endParaRPr lang="en-US" altLang="zh-CN" sz="1600">
+              <a:ln>
+                <a:noFill/>
+              </a:ln>
+              <a:solidFill>
+                <a:schemeClr val="bg1"/>
+              </a:solidFill>
+            </a:endParaRPr>
+          </a:p>
+        </p:txBody>
+      </p:sp>
+      <p:sp>
+        <p:nvSpPr>
+          <p:cNvPr id="8" name="文本框 7"/>
+          <p:cNvSpPr txBox="1"/>
+          <p:nvPr/>
+        </p:nvSpPr>
+        <p:spPr>
+          <a:xfrm>
+            <a:off x="8107045" y="3394075"/>
+            <a:ext cx="3142615" cy="384175"/>
+          </a:xfrm>
+          <a:prstGeom prst="rect">
+            <a:avLst/>
+          </a:prstGeom>
+          <a:solidFill>
+            <a:schemeClr val="accent1">
+              <a:lumMod val="75000"/>
+            </a:schemeClr>
+          </a:solidFill>
+          <a:ln>
+            <a:noFill/>
+          </a:ln>
+        </p:spPr>
+        <p:txBody>
+          <a:bodyPr wrap="square" rtlCol="0">
+            <a:noAutofit/>
+          </a:bodyPr>
+          <a:p>
+            <a:r>
+              <a:rPr lang="zh-CN" altLang="en-US" sz="1600">
+                <a:ln>
+                  <a:noFill/>
+                </a:ln>
+                <a:solidFill>
+                  <a:schemeClr val="bg1"/>
+                </a:solidFill>
+              </a:rPr>
+              <a:t>远裁剪面</a:t>
+            </a:r>
+            <a:r>
+              <a:rPr lang="en-US" altLang="zh-CN" sz="1600">
+                <a:ln>
+                  <a:noFill/>
+                </a:ln>
+                <a:solidFill>
+                  <a:schemeClr val="bg1"/>
+                </a:solidFill>
+              </a:rPr>
+              <a:t>            :          20</a:t>
+            </a:r>
+            <a:r>
+              <a:rPr lang="en-US" sz="1600">
+                <a:ln>
+                  <a:noFill/>
+                </a:ln>
+                <a:solidFill>
+                  <a:schemeClr val="bg1"/>
+                </a:solidFill>
+              </a:rPr>
+              <a:t>00mm</a:t>
+            </a:r>
+            <a:endParaRPr lang="en-US" sz="1600">
+              <a:ln>
+                <a:noFill/>
+              </a:ln>
+              <a:solidFill>
+                <a:schemeClr val="bg1"/>
+              </a:solidFill>
+            </a:endParaRPr>
+          </a:p>
+        </p:txBody>
+      </p:sp>
+    </p:spTree>
+  </p:cSld>
+  <p:clrMapOvr>
+    <a:masterClrMapping/>
+  </p:clrMapOvr>
+</p:sld>
+</file>
+
+<file path=ppt/slides/slide5.xml><?xml version="1.0" encoding="utf-8"?>
+<p:sld xmlns:a="http://schemas.openxmlformats.org/drawingml/2006/main" xmlns:r="http://schemas.openxmlformats.org/officeDocument/2006/relationships" xmlns:p="http://schemas.openxmlformats.org/presentationml/2006/main">
+  <p:cSld>
+    <p:spTree>
+      <p:nvGrpSpPr>
+        <p:cNvPr id="1" name=""/>
+        <p:cNvGrpSpPr/>
+        <p:nvPr/>
+      </p:nvGrpSpPr>
+      <p:grpSpPr/>
+      <p:graphicFrame>
+        <p:nvGraphicFramePr>
+          <p:cNvPr id="5" name="表格 4"/>
+          <p:cNvGraphicFramePr/>
+          <p:nvPr>
+            <p:custDataLst>
+              <p:tags r:id="rId1"/>
+            </p:custDataLst>
+          </p:nvPr>
+        </p:nvGraphicFramePr>
+        <p:xfrm>
+          <a:off x="708660" y="384810"/>
+          <a:ext cx="10774680" cy="6088380"/>
+        </p:xfrm>
+        <a:graphic>
+          <a:graphicData uri="http://schemas.openxmlformats.org/drawingml/2006/table">
+            <a:tbl>
+              <a:tblPr firstRow="1" bandRow="1">
+                <a:tableStyleId>{5C22544A-7EE6-4342-B048-85BDC9FD1C3A}</a:tableStyleId>
+              </a:tblPr>
+              <a:tblGrid>
+                <a:gridCol w="1795780"/>
+                <a:gridCol w="1795780"/>
+                <a:gridCol w="1795780"/>
+                <a:gridCol w="1795780"/>
+                <a:gridCol w="1795780"/>
+                <a:gridCol w="1795780"/>
+              </a:tblGrid>
+              <a:tr h="1014730">
+                <a:tc>
+                  <a:txBody>
+                    <a:bodyPr/>
+                    <a:p>
+                      <a:pPr algn="ctr">
+                        <a:buNone/>
+                      </a:pPr>
+                      <a:endParaRPr lang="zh-CN" altLang="en-US"/>
+                    </a:p>
+                  </a:txBody>
+                  <a:tcPr anchor="ctr" anchorCtr="0">
+                    <a:solidFill>
+                      <a:schemeClr val="tx2"/>
+                    </a:solidFill>
+                  </a:tcPr>
+                </a:tc>
+                <a:tc>
+                  <a:txBody>
+                    <a:bodyPr/>
+                    <a:p>
+                      <a:pPr algn="ctr">
+                        <a:buNone/>
+                      </a:pPr>
+                      <a:endParaRPr lang="zh-CN" altLang="en-US"/>
+                    </a:p>
+                  </a:txBody>
+                  <a:tcPr anchor="ctr" anchorCtr="0">
+                    <a:solidFill>
+                      <a:schemeClr val="tx2"/>
+                    </a:solidFill>
+                  </a:tcPr>
+                </a:tc>
+                <a:tc>
+                  <a:txBody>
+                    <a:bodyPr/>
+                    <a:p>
+                      <a:pPr algn="ctr">
+                        <a:buNone/>
+                      </a:pPr>
+                      <a:endParaRPr lang="zh-CN" altLang="en-US"/>
+                    </a:p>
+                  </a:txBody>
+                  <a:tcPr anchor="ctr" anchorCtr="0">
+                    <a:solidFill>
+                      <a:schemeClr val="tx2"/>
+                    </a:solidFill>
+                  </a:tcPr>
+                </a:tc>
+                <a:tc>
+                  <a:txBody>
+                    <a:bodyPr/>
+                    <a:p>
+                      <a:pPr algn="ctr">
+                        <a:buNone/>
+                      </a:pPr>
+                      <a:endParaRPr lang="zh-CN" altLang="en-US"/>
+                    </a:p>
+                  </a:txBody>
+                  <a:tcPr anchor="ctr" anchorCtr="0">
+                    <a:solidFill>
+                      <a:schemeClr val="tx2"/>
+                    </a:solidFill>
+                  </a:tcPr>
+                </a:tc>
+                <a:tc>
+                  <a:txBody>
+                    <a:bodyPr/>
+                    <a:p>
+                      <a:pPr algn="ctr">
+                        <a:buNone/>
+                      </a:pPr>
+                      <a:endParaRPr lang="zh-CN" altLang="en-US"/>
+                    </a:p>
+                  </a:txBody>
+                  <a:tcPr anchor="ctr" anchorCtr="0">
+                    <a:solidFill>
+                      <a:schemeClr val="tx2"/>
+                    </a:solidFill>
+                  </a:tcPr>
+                </a:tc>
+                <a:tc>
+                  <a:txBody>
+                    <a:bodyPr/>
+                    <a:p>
+                      <a:pPr algn="ctr">
+                        <a:buNone/>
+                      </a:pPr>
+                      <a:endParaRPr lang="zh-CN" altLang="en-US"/>
+                    </a:p>
+                  </a:txBody>
+                  <a:tcPr anchor="ctr" anchorCtr="0">
+                    <a:solidFill>
+                      <a:schemeClr val="tx2"/>
+                    </a:solidFill>
+                  </a:tcPr>
+                </a:tc>
+              </a:tr>
+              <a:tr h="1014730">
+                <a:tc rowSpan="5" gridSpan="3">
+                  <a:txBody>
+                    <a:bodyPr/>
+                    <a:p>
+                      <a:pPr algn="ctr">
+                        <a:buNone/>
+                      </a:pPr>
+                      <a:endParaRPr lang="zh-CN" altLang="en-US"/>
+                    </a:p>
+                  </a:txBody>
+                  <a:tcPr anchor="ctr" anchorCtr="0"/>
+                </a:tc>
+                <a:tc rowSpan="5" hMerge="1">
+                  <a:tcPr/>
+                </a:tc>
+                <a:tc rowSpan="5" hMerge="1">
+                  <a:tcPr/>
+                </a:tc>
+                <a:tc>
+                  <a:txBody>
+                    <a:bodyPr/>
+                    <a:p>
+                      <a:pPr algn="ctr">
+                        <a:buNone/>
+                      </a:pPr>
+                      <a:r>
+                        <a:rPr lang="zh-CN" altLang="en-US"/>
+                        <a:t>出图设置</a:t>
+                      </a:r>
+                      <a:endParaRPr lang="zh-CN" altLang="en-US"/>
+                    </a:p>
+                  </a:txBody>
+                  <a:tcPr anchor="ctr" anchorCtr="0">
+                    <a:solidFill>
+                      <a:schemeClr val="accent5">
+                        <a:lumMod val="20000"/>
+                        <a:lumOff val="80000"/>
+                      </a:schemeClr>
+                    </a:solidFill>
+                  </a:tcPr>
+                </a:tc>
+                <a:tc rowSpan="5" gridSpan="2">
+                  <a:txBody>
+                    <a:bodyPr/>
+                    <a:p>
+                      <a:pPr algn="ctr">
+                        <a:buNone/>
+                      </a:pPr>
+                      <a:endParaRPr lang="zh-CN" altLang="en-US"/>
+                    </a:p>
+                  </a:txBody>
+                  <a:tcPr anchor="ctr" anchorCtr="0">
+                    <a:solidFill>
+                      <a:schemeClr val="accent1"/>
+                    </a:solidFill>
+                  </a:tcPr>
+                </a:tc>
+                <a:tc rowSpan="5" hMerge="1">
+                  <a:tcPr anchor="ctr" anchorCtr="0"/>
+                </a:tc>
+              </a:tr>
+              <a:tr h="1014730">
+                <a:tc vMerge="1" gridSpan="3">
+                  <a:tcPr/>
+                </a:tc>
+                <a:tc vMerge="1" hMerge="1">
+                  <a:tcPr/>
+                </a:tc>
+                <a:tc vMerge="1" hMerge="1">
+                  <a:tcPr/>
+                </a:tc>
+                <a:tc>
+                  <a:txBody>
+                    <a:bodyPr/>
+                    <a:p>
+                      <a:pPr algn="ctr">
+                        <a:buNone/>
+                      </a:pPr>
+                      <a:r>
+                        <a:rPr lang="zh-CN" altLang="en-US"/>
+                        <a:t>环境设置</a:t>
+                      </a:r>
+                      <a:endParaRPr lang="zh-CN" altLang="en-US"/>
+                    </a:p>
+                  </a:txBody>
+                  <a:tcPr anchor="ctr" anchorCtr="0">
+                    <a:solidFill>
+                      <a:schemeClr val="accent5">
+                        <a:lumMod val="20000"/>
+                        <a:lumOff val="80000"/>
+                      </a:schemeClr>
+                    </a:solidFill>
+                  </a:tcPr>
+                </a:tc>
+                <a:tc vMerge="1" gridSpan="2">
+                  <a:tcPr anchor="ctr" anchorCtr="0"/>
+                </a:tc>
+                <a:tc vMerge="1" hMerge="1">
+                  <a:tcPr anchor="ctr" anchorCtr="0"/>
+                </a:tc>
+              </a:tr>
+              <a:tr h="1014730">
+                <a:tc vMerge="1" gridSpan="3">
+                  <a:tcPr/>
+                </a:tc>
+                <a:tc vMerge="1" hMerge="1">
+                  <a:tcPr/>
+                </a:tc>
+                <a:tc vMerge="1" hMerge="1">
+                  <a:tcPr/>
+                </a:tc>
+                <a:tc>
+                  <a:txBody>
+                    <a:bodyPr/>
+                    <a:p>
+                      <a:pPr algn="ctr">
+                        <a:buNone/>
+                      </a:pPr>
+                      <a:r>
+                        <a:rPr lang="zh-CN" altLang="en-US"/>
+                        <a:t>摄像机</a:t>
+                      </a:r>
+                      <a:endParaRPr lang="zh-CN" altLang="en-US"/>
+                    </a:p>
+                  </a:txBody>
+                  <a:tcPr anchor="ctr" anchorCtr="0">
+                    <a:solidFill>
+                      <a:schemeClr val="accent5">
+                        <a:lumMod val="20000"/>
+                        <a:lumOff val="80000"/>
+                      </a:schemeClr>
+                    </a:solidFill>
+                  </a:tcPr>
+                </a:tc>
+                <a:tc vMerge="1" gridSpan="2">
+                  <a:tcPr anchor="ctr" anchorCtr="0"/>
+                </a:tc>
+                <a:tc vMerge="1" hMerge="1">
+                  <a:tcPr anchor="ctr" anchorCtr="0"/>
+                </a:tc>
+              </a:tr>
+              <a:tr h="1014730">
+                <a:tc vMerge="1" gridSpan="3">
+                  <a:tcPr/>
+                </a:tc>
+                <a:tc vMerge="1" hMerge="1">
+                  <a:tcPr/>
+                </a:tc>
+                <a:tc vMerge="1" hMerge="1">
+                  <a:tcPr/>
+                </a:tc>
+                <a:tc>
+                  <a:txBody>
+                    <a:bodyPr/>
+                    <a:p>
+                      <a:pPr algn="ctr">
+                        <a:buNone/>
+                      </a:pPr>
+                      <a:r>
+                        <a:rPr lang="zh-CN" altLang="en-US"/>
+                        <a:t>材质</a:t>
+                      </a:r>
+                      <a:endParaRPr lang="zh-CN" altLang="en-US"/>
+                    </a:p>
+                  </a:txBody>
+                  <a:tcPr anchor="ctr" anchorCtr="0">
+                    <a:solidFill>
+                      <a:schemeClr val="accent1"/>
+                    </a:solidFill>
+                  </a:tcPr>
+                </a:tc>
+                <a:tc vMerge="1" gridSpan="2">
+                  <a:tcPr anchor="ctr" anchorCtr="0"/>
+                </a:tc>
+                <a:tc vMerge="1" hMerge="1">
+                  <a:tcPr anchor="ctr" anchorCtr="0"/>
+                </a:tc>
+              </a:tr>
+              <a:tr h="1014730">
+                <a:tc vMerge="1" gridSpan="3">
+                  <a:tcPr/>
+                </a:tc>
+                <a:tc vMerge="1" hMerge="1">
+                  <a:tcPr/>
+                </a:tc>
+                <a:tc vMerge="1" hMerge="1">
+                  <a:tcPr/>
+                </a:tc>
+                <a:tc>
+                  <a:txBody>
+                    <a:bodyPr/>
+                    <a:p>
+                      <a:pPr algn="ctr">
+                        <a:buNone/>
+                      </a:pPr>
+                      <a:r>
+                        <a:rPr lang="zh-CN" altLang="en-US"/>
+                        <a:t>灯光</a:t>
+                      </a:r>
+                      <a:endParaRPr lang="zh-CN" altLang="en-US"/>
+                    </a:p>
+                  </a:txBody>
+                  <a:tcPr anchor="ctr" anchorCtr="0">
+                    <a:solidFill>
+                      <a:schemeClr val="accent5">
+                        <a:lumMod val="20000"/>
+                        <a:lumOff val="80000"/>
+                      </a:schemeClr>
+                    </a:solidFill>
+                  </a:tcPr>
+                </a:tc>
+                <a:tc vMerge="1" gridSpan="2">
+                  <a:tcPr anchor="ctr" anchorCtr="0"/>
+                </a:tc>
+                <a:tc vMerge="1" hMerge="1">
+                  <a:tcPr anchor="ctr" anchorCtr="0"/>
+                </a:tc>
+              </a:tr>
+            </a:tbl>
+          </a:graphicData>
+        </a:graphic>
+      </p:graphicFrame>
+      <p:pic>
+        <p:nvPicPr>
+          <p:cNvPr id="2" name="图片 1"/>
+          <p:cNvPicPr>
+            <a:picLocks noChangeAspect="1"/>
+          </p:cNvPicPr>
+          <p:nvPr>
+            <p:custDataLst>
+              <p:tags r:id="rId2"/>
+            </p:custDataLst>
+          </p:nvPr>
+        </p:nvPicPr>
+        <p:blipFill>
+          <a:blip r:embed="rId3"/>
+          <a:stretch>
+            <a:fillRect/>
+          </a:stretch>
+        </p:blipFill>
+        <p:spPr>
+          <a:xfrm>
+            <a:off x="996950" y="1576070"/>
+            <a:ext cx="4773930" cy="4718050"/>
+          </a:xfrm>
+          <a:prstGeom prst="rect">
+            <a:avLst/>
+          </a:prstGeom>
+          <a:effectLst>
+            <a:softEdge rad="50800"/>
+          </a:effectLst>
+        </p:spPr>
+      </p:pic>
+      <p:sp>
+        <p:nvSpPr>
+          <p:cNvPr id="3" name="文本框 2"/>
+          <p:cNvSpPr txBox="1"/>
+          <p:nvPr/>
+        </p:nvSpPr>
+        <p:spPr>
+          <a:xfrm>
+            <a:off x="8161020" y="1715770"/>
+            <a:ext cx="3142615" cy="384175"/>
+          </a:xfrm>
+          <a:prstGeom prst="rect">
+            <a:avLst/>
+          </a:prstGeom>
+          <a:solidFill>
+            <a:schemeClr val="accent1">
+              <a:lumMod val="75000"/>
+            </a:schemeClr>
+          </a:solidFill>
+          <a:ln>
+            <a:noFill/>
+          </a:ln>
+        </p:spPr>
+        <p:txBody>
+          <a:bodyPr wrap="square" rtlCol="0">
+            <a:noAutofit/>
+          </a:bodyPr>
+          <a:p>
+            <a:r>
+              <a:rPr lang="zh-CN" altLang="en-US" sz="1600">
+                <a:ln>
+                  <a:noFill/>
+                </a:ln>
+                <a:solidFill>
+                  <a:schemeClr val="bg1"/>
+                </a:solidFill>
+              </a:rPr>
+              <a:t>颜色</a:t>
+            </a:r>
+            <a:r>
+              <a:rPr lang="en-US" altLang="zh-CN" sz="1600">
+                <a:ln>
+                  <a:noFill/>
+                </a:ln>
+                <a:solidFill>
+                  <a:schemeClr val="bg1"/>
+                </a:solidFill>
+              </a:rPr>
+              <a:t>                 :       0x00aa00</a:t>
+            </a:r>
+            <a:endParaRPr lang="en-US" altLang="zh-CN" sz="1600">
+              <a:ln>
+                <a:noFill/>
+              </a:ln>
+              <a:solidFill>
+                <a:schemeClr val="bg1"/>
+              </a:solidFill>
+            </a:endParaRPr>
+          </a:p>
+        </p:txBody>
+      </p:sp>
+      <p:sp>
+        <p:nvSpPr>
+          <p:cNvPr id="4" name="文本框 3"/>
+          <p:cNvSpPr txBox="1"/>
+          <p:nvPr/>
+        </p:nvSpPr>
+        <p:spPr>
+          <a:xfrm>
+            <a:off x="8161020" y="2255520"/>
+            <a:ext cx="3142615" cy="384175"/>
+          </a:xfrm>
+          <a:prstGeom prst="rect">
+            <a:avLst/>
+          </a:prstGeom>
+          <a:solidFill>
+            <a:schemeClr val="accent1">
+              <a:lumMod val="75000"/>
+            </a:schemeClr>
+          </a:solidFill>
+          <a:ln>
+            <a:noFill/>
+          </a:ln>
+        </p:spPr>
+        <p:txBody>
+          <a:bodyPr wrap="square" rtlCol="0">
+            <a:noAutofit/>
+          </a:bodyPr>
+          <a:p>
+            <a:r>
+              <a:rPr lang="zh-CN" altLang="en-US" sz="1600">
+                <a:ln>
+                  <a:noFill/>
+                </a:ln>
+                <a:solidFill>
+                  <a:schemeClr val="bg1"/>
+                </a:solidFill>
+              </a:rPr>
+              <a:t>反射率</a:t>
+            </a:r>
+            <a:r>
+              <a:rPr lang="en-US" altLang="zh-CN" sz="1600">
+                <a:ln>
+                  <a:noFill/>
+                </a:ln>
+                <a:solidFill>
+                  <a:schemeClr val="bg1"/>
+                </a:solidFill>
+              </a:rPr>
+              <a:t>             :       0.5</a:t>
+            </a:r>
+            <a:endParaRPr lang="en-US" altLang="zh-CN" sz="1600">
+              <a:ln>
+                <a:noFill/>
+              </a:ln>
+              <a:solidFill>
+                <a:schemeClr val="bg1"/>
+              </a:solidFill>
+            </a:endParaRPr>
+          </a:p>
+        </p:txBody>
+      </p:sp>
+      <p:sp>
+        <p:nvSpPr>
+          <p:cNvPr id="6" name="文本框 5"/>
+          <p:cNvSpPr txBox="1"/>
+          <p:nvPr/>
+        </p:nvSpPr>
+        <p:spPr>
+          <a:xfrm>
+            <a:off x="8161020" y="2795270"/>
+            <a:ext cx="3142615" cy="384175"/>
+          </a:xfrm>
+          <a:prstGeom prst="rect">
+            <a:avLst/>
+          </a:prstGeom>
+          <a:solidFill>
+            <a:schemeClr val="accent1">
+              <a:lumMod val="75000"/>
+            </a:schemeClr>
+          </a:solidFill>
+          <a:ln>
+            <a:noFill/>
+          </a:ln>
+        </p:spPr>
+        <p:txBody>
+          <a:bodyPr wrap="square" rtlCol="0">
+            <a:noAutofit/>
+          </a:bodyPr>
+          <a:p>
+            <a:r>
+              <a:rPr lang="zh-CN" altLang="en-US" sz="1600">
+                <a:ln>
+                  <a:noFill/>
+                </a:ln>
+                <a:solidFill>
+                  <a:schemeClr val="bg1"/>
+                </a:solidFill>
+              </a:rPr>
+              <a:t>金属度</a:t>
+            </a:r>
+            <a:r>
+              <a:rPr lang="en-US" altLang="zh-CN" sz="1600">
+                <a:ln>
+                  <a:noFill/>
+                </a:ln>
+                <a:solidFill>
+                  <a:schemeClr val="bg1"/>
+                </a:solidFill>
+              </a:rPr>
+              <a:t>             :       0.5</a:t>
+            </a:r>
+            <a:endParaRPr lang="en-US" altLang="zh-CN" sz="1600">
+              <a:ln>
+                <a:noFill/>
+              </a:ln>
+              <a:solidFill>
+                <a:schemeClr val="bg1"/>
+              </a:solidFill>
+            </a:endParaRPr>
+          </a:p>
+        </p:txBody>
+      </p:sp>
+      <p:sp>
+        <p:nvSpPr>
+          <p:cNvPr id="7" name="文本框 6"/>
+          <p:cNvSpPr txBox="1"/>
+          <p:nvPr/>
+        </p:nvSpPr>
+        <p:spPr>
+          <a:xfrm>
+            <a:off x="8161020" y="3335020"/>
+            <a:ext cx="3142615" cy="384175"/>
+          </a:xfrm>
+          <a:prstGeom prst="rect">
+            <a:avLst/>
+          </a:prstGeom>
+          <a:solidFill>
+            <a:schemeClr val="accent1">
+              <a:lumMod val="75000"/>
+            </a:schemeClr>
+          </a:solidFill>
+          <a:ln>
+            <a:noFill/>
+          </a:ln>
+        </p:spPr>
+        <p:txBody>
+          <a:bodyPr wrap="square" rtlCol="0">
+            <a:noAutofit/>
+          </a:bodyPr>
+          <a:p>
+            <a:r>
+              <a:rPr lang="zh-CN" altLang="en-US" sz="1600">
+                <a:ln>
+                  <a:noFill/>
+                </a:ln>
+                <a:solidFill>
+                  <a:schemeClr val="bg1"/>
+                </a:solidFill>
+              </a:rPr>
+              <a:t>粗糙度</a:t>
+            </a:r>
+            <a:r>
+              <a:rPr lang="en-US" altLang="zh-CN" sz="1600">
+                <a:ln>
+                  <a:noFill/>
+                </a:ln>
+                <a:solidFill>
+                  <a:schemeClr val="bg1"/>
+                </a:solidFill>
+              </a:rPr>
+              <a:t>              :       0.5</a:t>
+            </a:r>
+            <a:endParaRPr lang="en-US" altLang="zh-CN" sz="1600">
+              <a:ln>
+                <a:noFill/>
+              </a:ln>
+              <a:solidFill>
+                <a:schemeClr val="bg1"/>
+              </a:solidFill>
+            </a:endParaRPr>
+          </a:p>
+        </p:txBody>
+      </p:sp>
+      <p:sp>
+        <p:nvSpPr>
+          <p:cNvPr id="8" name="文本框 7"/>
+          <p:cNvSpPr txBox="1"/>
+          <p:nvPr/>
+        </p:nvSpPr>
+        <p:spPr>
+          <a:xfrm>
+            <a:off x="8161020" y="3874770"/>
+            <a:ext cx="3142615" cy="384175"/>
+          </a:xfrm>
+          <a:prstGeom prst="rect">
+            <a:avLst/>
+          </a:prstGeom>
+          <a:solidFill>
+            <a:schemeClr val="accent1">
+              <a:lumMod val="75000"/>
+            </a:schemeClr>
+          </a:solidFill>
+          <a:ln>
+            <a:noFill/>
+          </a:ln>
+        </p:spPr>
+        <p:txBody>
+          <a:bodyPr wrap="square" rtlCol="0">
+            <a:noAutofit/>
+          </a:bodyPr>
+          <a:p>
+            <a:r>
+              <a:rPr lang="zh-CN" altLang="en-US" sz="1600">
+                <a:ln>
+                  <a:noFill/>
+                </a:ln>
+                <a:solidFill>
+                  <a:schemeClr val="bg1"/>
+                </a:solidFill>
+              </a:rPr>
+              <a:t>凹凸强度</a:t>
+            </a:r>
+            <a:r>
+              <a:rPr lang="en-US" altLang="zh-CN" sz="1600">
+                <a:ln>
+                  <a:noFill/>
+                </a:ln>
+                <a:solidFill>
+                  <a:schemeClr val="bg1"/>
+                </a:solidFill>
+              </a:rPr>
+              <a:t>          :       1.0</a:t>
+            </a:r>
+            <a:endParaRPr lang="en-US" altLang="zh-CN" sz="1600">
+              <a:ln>
+                <a:noFill/>
+              </a:ln>
+              <a:solidFill>
+                <a:schemeClr val="bg1"/>
+              </a:solidFill>
+            </a:endParaRPr>
+          </a:p>
+        </p:txBody>
+      </p:sp>
+      <p:sp>
+        <p:nvSpPr>
+          <p:cNvPr id="9" name="文本框 8"/>
+          <p:cNvSpPr txBox="1"/>
+          <p:nvPr/>
+        </p:nvSpPr>
+        <p:spPr>
+          <a:xfrm>
+            <a:off x="8161020" y="4471670"/>
+            <a:ext cx="3142615" cy="384175"/>
+          </a:xfrm>
+          <a:prstGeom prst="rect">
+            <a:avLst/>
+          </a:prstGeom>
+          <a:solidFill>
+            <a:schemeClr val="accent1">
+              <a:lumMod val="75000"/>
+            </a:schemeClr>
+          </a:solidFill>
+          <a:ln>
+            <a:noFill/>
+          </a:ln>
+        </p:spPr>
+        <p:txBody>
+          <a:bodyPr wrap="square" rtlCol="0">
+            <a:noAutofit/>
+          </a:bodyPr>
+          <a:p>
+            <a:r>
+              <a:rPr lang="en-US" altLang="zh-CN" sz="1600">
+                <a:ln>
+                  <a:noFill/>
+                </a:ln>
+                <a:solidFill>
+                  <a:schemeClr val="bg1"/>
+                </a:solidFill>
+              </a:rPr>
+              <a:t>UV</a:t>
+            </a:r>
+            <a:r>
+              <a:rPr lang="zh-CN" altLang="en-US" sz="1600">
+                <a:ln>
+                  <a:noFill/>
+                </a:ln>
+                <a:solidFill>
+                  <a:schemeClr val="bg1"/>
+                </a:solidFill>
+              </a:rPr>
+              <a:t>缩放</a:t>
+            </a:r>
+            <a:r>
+              <a:rPr lang="en-US" altLang="zh-CN" sz="1600">
+                <a:ln>
+                  <a:noFill/>
+                </a:ln>
+                <a:solidFill>
+                  <a:schemeClr val="bg1"/>
+                </a:solidFill>
+              </a:rPr>
+              <a:t>X           :       1.0</a:t>
+            </a:r>
+            <a:endParaRPr lang="en-US" altLang="zh-CN" sz="1600">
+              <a:ln>
+                <a:noFill/>
+              </a:ln>
+              <a:solidFill>
+                <a:schemeClr val="bg1"/>
+              </a:solidFill>
+            </a:endParaRPr>
+          </a:p>
+        </p:txBody>
+      </p:sp>
+      <p:sp>
+        <p:nvSpPr>
+          <p:cNvPr id="10" name="文本框 9"/>
+          <p:cNvSpPr txBox="1"/>
+          <p:nvPr/>
+        </p:nvSpPr>
+        <p:spPr>
+          <a:xfrm>
+            <a:off x="8161020" y="4954270"/>
+            <a:ext cx="3142615" cy="384175"/>
+          </a:xfrm>
+          <a:prstGeom prst="rect">
+            <a:avLst/>
+          </a:prstGeom>
+          <a:solidFill>
+            <a:schemeClr val="accent1">
+              <a:lumMod val="75000"/>
+            </a:schemeClr>
+          </a:solidFill>
+          <a:ln>
+            <a:noFill/>
+          </a:ln>
+        </p:spPr>
+        <p:txBody>
+          <a:bodyPr wrap="square" rtlCol="0">
+            <a:noAutofit/>
+          </a:bodyPr>
+          <a:p>
+            <a:r>
+              <a:rPr lang="en-US" altLang="zh-CN" sz="1600">
+                <a:ln>
+                  <a:noFill/>
+                </a:ln>
+                <a:solidFill>
+                  <a:schemeClr val="bg1"/>
+                </a:solidFill>
+              </a:rPr>
+              <a:t>UV</a:t>
+            </a:r>
+            <a:r>
+              <a:rPr lang="zh-CN" altLang="en-US" sz="1600">
+                <a:ln>
+                  <a:noFill/>
+                </a:ln>
+                <a:solidFill>
+                  <a:schemeClr val="bg1"/>
+                </a:solidFill>
+              </a:rPr>
+              <a:t>缩放</a:t>
+            </a:r>
+            <a:r>
+              <a:rPr lang="en-US" altLang="zh-CN" sz="1600">
+                <a:ln>
+                  <a:noFill/>
+                </a:ln>
+                <a:solidFill>
+                  <a:schemeClr val="bg1"/>
+                </a:solidFill>
+              </a:rPr>
+              <a:t>Y           :       1.0</a:t>
+            </a:r>
+            <a:endParaRPr lang="en-US" altLang="zh-CN" sz="1600">
+              <a:ln>
+                <a:noFill/>
+              </a:ln>
+              <a:solidFill>
+                <a:schemeClr val="bg1"/>
+              </a:solidFill>
+            </a:endParaRPr>
+          </a:p>
+        </p:txBody>
+      </p:sp>
+    </p:spTree>
+  </p:cSld>
+  <p:clrMapOvr>
+    <a:masterClrMapping/>
+  </p:clrMapOvr>
+</p:sld>
+</file>
+
+<file path=ppt/slides/slide6.xml><?xml version="1.0" encoding="utf-8"?>
+<p:sld xmlns:a="http://schemas.openxmlformats.org/drawingml/2006/main" xmlns:r="http://schemas.openxmlformats.org/officeDocument/2006/relationships" xmlns:p="http://schemas.openxmlformats.org/presentationml/2006/main">
+  <p:cSld>
+    <p:spTree>
+      <p:nvGrpSpPr>
+        <p:cNvPr id="1" name=""/>
+        <p:cNvGrpSpPr/>
+        <p:nvPr/>
+      </p:nvGrpSpPr>
+      <p:grpSpPr/>
+      <p:graphicFrame>
+        <p:nvGraphicFramePr>
+          <p:cNvPr id="5" name="表格 4"/>
+          <p:cNvGraphicFramePr/>
+          <p:nvPr>
+            <p:custDataLst>
+              <p:tags r:id="rId1"/>
+            </p:custDataLst>
+          </p:nvPr>
+        </p:nvGraphicFramePr>
+        <p:xfrm>
+          <a:off x="708660" y="384810"/>
+          <a:ext cx="10774680" cy="6088380"/>
+        </p:xfrm>
+        <a:graphic>
+          <a:graphicData uri="http://schemas.openxmlformats.org/drawingml/2006/table">
+            <a:tbl>
+              <a:tblPr firstRow="1" bandRow="1">
+                <a:tableStyleId>{5C22544A-7EE6-4342-B048-85BDC9FD1C3A}</a:tableStyleId>
+              </a:tblPr>
+              <a:tblGrid>
+                <a:gridCol w="1795780"/>
+                <a:gridCol w="1795780"/>
+                <a:gridCol w="1795780"/>
+                <a:gridCol w="1795780"/>
+                <a:gridCol w="1795780"/>
+                <a:gridCol w="1795780"/>
+              </a:tblGrid>
+              <a:tr h="1014730">
+                <a:tc>
+                  <a:txBody>
+                    <a:bodyPr/>
+                    <a:p>
+                      <a:pPr algn="ctr">
+                        <a:buNone/>
+                      </a:pPr>
+                      <a:endParaRPr lang="zh-CN" altLang="en-US"/>
+                    </a:p>
+                  </a:txBody>
+                  <a:tcPr anchor="ctr" anchorCtr="0">
+                    <a:solidFill>
+                      <a:schemeClr val="tx2"/>
+                    </a:solidFill>
+                  </a:tcPr>
+                </a:tc>
+                <a:tc>
+                  <a:txBody>
+                    <a:bodyPr/>
+                    <a:p>
+                      <a:pPr algn="ctr">
+                        <a:buNone/>
+                      </a:pPr>
+                      <a:endParaRPr lang="zh-CN" altLang="en-US"/>
+                    </a:p>
+                  </a:txBody>
+                  <a:tcPr anchor="ctr" anchorCtr="0">
+                    <a:solidFill>
+                      <a:schemeClr val="tx2"/>
+                    </a:solidFill>
+                  </a:tcPr>
+                </a:tc>
+                <a:tc>
+                  <a:txBody>
+                    <a:bodyPr/>
+                    <a:p>
+                      <a:pPr algn="ctr">
+                        <a:buNone/>
+                      </a:pPr>
+                      <a:endParaRPr lang="zh-CN" altLang="en-US"/>
+                    </a:p>
+                  </a:txBody>
+                  <a:tcPr anchor="ctr" anchorCtr="0">
+                    <a:solidFill>
+                      <a:schemeClr val="tx2"/>
+                    </a:solidFill>
+                  </a:tcPr>
+                </a:tc>
+                <a:tc>
+                  <a:txBody>
+                    <a:bodyPr/>
+                    <a:p>
+                      <a:pPr algn="ctr">
+                        <a:buNone/>
+                      </a:pPr>
+                      <a:endParaRPr lang="zh-CN" altLang="en-US"/>
+                    </a:p>
+                  </a:txBody>
+                  <a:tcPr anchor="ctr" anchorCtr="0">
+                    <a:solidFill>
+                      <a:schemeClr val="tx2"/>
+                    </a:solidFill>
+                  </a:tcPr>
+                </a:tc>
+                <a:tc>
+                  <a:txBody>
+                    <a:bodyPr/>
+                    <a:p>
+                      <a:pPr algn="ctr">
+                        <a:buNone/>
+                      </a:pPr>
+                      <a:endParaRPr lang="zh-CN" altLang="en-US"/>
+                    </a:p>
+                  </a:txBody>
+                  <a:tcPr anchor="ctr" anchorCtr="0">
+                    <a:solidFill>
+                      <a:schemeClr val="tx2"/>
+                    </a:solidFill>
+                  </a:tcPr>
+                </a:tc>
+                <a:tc>
+                  <a:txBody>
+                    <a:bodyPr/>
+                    <a:p>
+                      <a:pPr algn="ctr">
+                        <a:buNone/>
+                      </a:pPr>
+                      <a:endParaRPr lang="zh-CN" altLang="en-US"/>
+                    </a:p>
+                  </a:txBody>
+                  <a:tcPr anchor="ctr" anchorCtr="0">
+                    <a:solidFill>
+                      <a:schemeClr val="tx2"/>
+                    </a:solidFill>
+                  </a:tcPr>
+                </a:tc>
+              </a:tr>
+              <a:tr h="1014730">
+                <a:tc rowSpan="5" gridSpan="3">
+                  <a:txBody>
+                    <a:bodyPr/>
+                    <a:p>
+                      <a:pPr algn="ctr">
+                        <a:buNone/>
+                      </a:pPr>
+                      <a:endParaRPr lang="zh-CN" altLang="en-US"/>
+                    </a:p>
+                  </a:txBody>
+                  <a:tcPr anchor="ctr" anchorCtr="0"/>
+                </a:tc>
+                <a:tc rowSpan="5" hMerge="1">
+                  <a:tcPr/>
+                </a:tc>
+                <a:tc rowSpan="5" hMerge="1">
+                  <a:tcPr/>
+                </a:tc>
+                <a:tc>
+                  <a:txBody>
+                    <a:bodyPr/>
+                    <a:p>
+                      <a:pPr algn="ctr">
+                        <a:buNone/>
+                      </a:pPr>
+                      <a:r>
+                        <a:rPr lang="zh-CN" altLang="en-US"/>
+                        <a:t>出图设置</a:t>
+                      </a:r>
+                      <a:endParaRPr lang="zh-CN" altLang="en-US"/>
+                    </a:p>
+                  </a:txBody>
+                  <a:tcPr anchor="ctr" anchorCtr="0">
+                    <a:solidFill>
+                      <a:schemeClr val="accent5">
+                        <a:lumMod val="20000"/>
+                        <a:lumOff val="80000"/>
+                      </a:schemeClr>
+                    </a:solidFill>
+                  </a:tcPr>
+                </a:tc>
+                <a:tc rowSpan="5" gridSpan="2">
+                  <a:txBody>
+                    <a:bodyPr/>
+                    <a:p>
+                      <a:pPr algn="ctr">
+                        <a:buNone/>
+                      </a:pPr>
+                      <a:endParaRPr lang="zh-CN" altLang="en-US"/>
+                    </a:p>
+                  </a:txBody>
+                  <a:tcPr anchor="ctr" anchorCtr="0">
+                    <a:solidFill>
+                      <a:schemeClr val="accent1"/>
+                    </a:solidFill>
+                  </a:tcPr>
+                </a:tc>
+                <a:tc rowSpan="5" hMerge="1">
+                  <a:tcPr anchor="ctr" anchorCtr="0"/>
+                </a:tc>
+              </a:tr>
+              <a:tr h="1014730">
+                <a:tc vMerge="1" gridSpan="3">
+                  <a:tcPr/>
+                </a:tc>
+                <a:tc vMerge="1" hMerge="1">
+                  <a:tcPr/>
+                </a:tc>
+                <a:tc vMerge="1" hMerge="1">
+                  <a:tcPr/>
+                </a:tc>
+                <a:tc>
+                  <a:txBody>
+                    <a:bodyPr/>
+                    <a:p>
+                      <a:pPr algn="ctr">
+                        <a:buNone/>
+                      </a:pPr>
+                      <a:r>
+                        <a:rPr lang="zh-CN" altLang="en-US"/>
+                        <a:t>环境设置</a:t>
+                      </a:r>
+                      <a:endParaRPr lang="zh-CN" altLang="en-US"/>
+                    </a:p>
+                  </a:txBody>
+                  <a:tcPr anchor="ctr" anchorCtr="0">
+                    <a:solidFill>
+                      <a:schemeClr val="accent5">
+                        <a:lumMod val="20000"/>
+                        <a:lumOff val="80000"/>
+                      </a:schemeClr>
+                    </a:solidFill>
+                  </a:tcPr>
+                </a:tc>
+                <a:tc vMerge="1" gridSpan="2">
+                  <a:tcPr anchor="ctr" anchorCtr="0"/>
+                </a:tc>
+                <a:tc vMerge="1" hMerge="1">
+                  <a:tcPr anchor="ctr" anchorCtr="0"/>
+                </a:tc>
+              </a:tr>
+              <a:tr h="1014730">
+                <a:tc vMerge="1" gridSpan="3">
+                  <a:tcPr/>
+                </a:tc>
+                <a:tc vMerge="1" hMerge="1">
+                  <a:tcPr/>
+                </a:tc>
+                <a:tc vMerge="1" hMerge="1">
+                  <a:tcPr/>
+                </a:tc>
+                <a:tc>
+                  <a:txBody>
+                    <a:bodyPr/>
+                    <a:p>
+                      <a:pPr algn="ctr">
+                        <a:buNone/>
+                      </a:pPr>
+                      <a:r>
+                        <a:rPr lang="zh-CN" altLang="en-US"/>
+                        <a:t>摄像机</a:t>
+                      </a:r>
+                      <a:endParaRPr lang="zh-CN" altLang="en-US"/>
+                    </a:p>
+                  </a:txBody>
+                  <a:tcPr anchor="ctr" anchorCtr="0">
+                    <a:solidFill>
+                      <a:schemeClr val="accent5">
+                        <a:lumMod val="20000"/>
+                        <a:lumOff val="80000"/>
+                      </a:schemeClr>
+                    </a:solidFill>
+                  </a:tcPr>
+                </a:tc>
+                <a:tc vMerge="1" gridSpan="2">
+                  <a:tcPr anchor="ctr" anchorCtr="0"/>
+                </a:tc>
+                <a:tc vMerge="1" hMerge="1">
+                  <a:tcPr anchor="ctr" anchorCtr="0"/>
+                </a:tc>
+              </a:tr>
+              <a:tr h="1014730">
+                <a:tc vMerge="1" gridSpan="3">
+                  <a:tcPr/>
+                </a:tc>
+                <a:tc vMerge="1" hMerge="1">
+                  <a:tcPr/>
+                </a:tc>
+                <a:tc vMerge="1" hMerge="1">
+                  <a:tcPr/>
+                </a:tc>
+                <a:tc>
+                  <a:txBody>
+                    <a:bodyPr/>
+                    <a:p>
+                      <a:pPr algn="ctr">
+                        <a:buNone/>
+                      </a:pPr>
+                      <a:r>
+                        <a:rPr lang="zh-CN" altLang="en-US"/>
+                        <a:t>材质</a:t>
+                      </a:r>
+                      <a:endParaRPr lang="zh-CN" altLang="en-US"/>
+                    </a:p>
+                  </a:txBody>
+                  <a:tcPr anchor="ctr" anchorCtr="0">
+                    <a:solidFill>
+                      <a:schemeClr val="accent5">
+                        <a:lumMod val="20000"/>
+                        <a:lumOff val="80000"/>
+                      </a:schemeClr>
+                    </a:solidFill>
+                  </a:tcPr>
+                </a:tc>
+                <a:tc vMerge="1" gridSpan="2">
+                  <a:tcPr anchor="ctr" anchorCtr="0"/>
+                </a:tc>
+                <a:tc vMerge="1" hMerge="1">
+                  <a:tcPr anchor="ctr" anchorCtr="0"/>
+                </a:tc>
+              </a:tr>
+              <a:tr h="1014730">
+                <a:tc vMerge="1" gridSpan="3">
+                  <a:tcPr/>
+                </a:tc>
+                <a:tc vMerge="1" hMerge="1">
+                  <a:tcPr/>
+                </a:tc>
+                <a:tc vMerge="1" hMerge="1">
+                  <a:tcPr/>
+                </a:tc>
+                <a:tc>
+                  <a:txBody>
+                    <a:bodyPr/>
+                    <a:p>
+                      <a:pPr algn="ctr">
+                        <a:buNone/>
+                      </a:pPr>
+                      <a:r>
+                        <a:rPr lang="zh-CN" altLang="en-US"/>
+                        <a:t>灯光</a:t>
+                      </a:r>
+                      <a:endParaRPr lang="zh-CN" altLang="en-US"/>
+                    </a:p>
+                  </a:txBody>
+                  <a:tcPr anchor="ctr" anchorCtr="0">
+                    <a:solidFill>
+                      <a:schemeClr val="accent1"/>
+                    </a:solidFill>
+                  </a:tcPr>
+                </a:tc>
+                <a:tc vMerge="1" gridSpan="2">
+                  <a:tcPr anchor="ctr" anchorCtr="0"/>
+                </a:tc>
+                <a:tc vMerge="1" hMerge="1">
+                  <a:tcPr anchor="ctr" anchorCtr="0"/>
+                </a:tc>
+              </a:tr>
+            </a:tbl>
+          </a:graphicData>
+        </a:graphic>
+      </p:graphicFrame>
+      <p:pic>
+        <p:nvPicPr>
+          <p:cNvPr id="2" name="图片 1"/>
+          <p:cNvPicPr>
+            <a:picLocks noChangeAspect="1"/>
+          </p:cNvPicPr>
+          <p:nvPr>
+            <p:custDataLst>
+              <p:tags r:id="rId2"/>
+            </p:custDataLst>
+          </p:nvPr>
+        </p:nvPicPr>
+        <p:blipFill>
+          <a:blip r:embed="rId3"/>
+          <a:stretch>
+            <a:fillRect/>
+          </a:stretch>
+        </p:blipFill>
+        <p:spPr>
+          <a:xfrm>
+            <a:off x="996950" y="1576070"/>
+            <a:ext cx="4773930" cy="4718050"/>
+          </a:xfrm>
+          <a:prstGeom prst="rect">
+            <a:avLst/>
+          </a:prstGeom>
+          <a:effectLst>
+            <a:softEdge rad="50800"/>
+          </a:effectLst>
+        </p:spPr>
+      </p:pic>
+      <p:sp>
+        <p:nvSpPr>
+          <p:cNvPr id="3" name="文本框 2"/>
+          <p:cNvSpPr txBox="1"/>
+          <p:nvPr/>
+        </p:nvSpPr>
+        <p:spPr>
+          <a:xfrm>
+            <a:off x="8107045" y="2157095"/>
+            <a:ext cx="3142615" cy="384175"/>
+          </a:xfrm>
+          <a:prstGeom prst="rect">
+            <a:avLst/>
+          </a:prstGeom>
+          <a:solidFill>
+            <a:schemeClr val="accent1">
+              <a:lumMod val="75000"/>
+            </a:schemeClr>
+          </a:solidFill>
+          <a:ln>
+            <a:noFill/>
+          </a:ln>
+        </p:spPr>
+        <p:txBody>
+          <a:bodyPr wrap="square" rtlCol="0">
+            <a:noAutofit/>
+          </a:bodyPr>
+          <a:p>
+            <a:r>
+              <a:rPr lang="zh-CN" altLang="en-US" sz="1600">
+                <a:ln>
+                  <a:noFill/>
+                </a:ln>
+                <a:solidFill>
+                  <a:schemeClr val="bg1"/>
+                </a:solidFill>
+              </a:rPr>
+              <a:t>颜色</a:t>
+            </a:r>
+            <a:r>
+              <a:rPr lang="en-US" altLang="zh-CN" sz="1600">
+                <a:ln>
+                  <a:noFill/>
+                </a:ln>
+                <a:solidFill>
+                  <a:schemeClr val="bg1"/>
+                </a:solidFill>
+              </a:rPr>
+              <a:t>                    :       0xAA3366</a:t>
+            </a:r>
+            <a:endParaRPr lang="en-US" altLang="zh-CN" sz="1600">
+              <a:ln>
+                <a:noFill/>
+              </a:ln>
+              <a:solidFill>
+                <a:schemeClr val="bg1"/>
+              </a:solidFill>
+            </a:endParaRPr>
+          </a:p>
+        </p:txBody>
+      </p:sp>
+      <p:sp>
+        <p:nvSpPr>
+          <p:cNvPr id="4" name="文本框 3"/>
+          <p:cNvSpPr txBox="1"/>
+          <p:nvPr/>
+        </p:nvSpPr>
+        <p:spPr>
+          <a:xfrm>
+            <a:off x="8107045" y="2741295"/>
+            <a:ext cx="3142615" cy="384175"/>
+          </a:xfrm>
+          <a:prstGeom prst="rect">
+            <a:avLst/>
+          </a:prstGeom>
+          <a:solidFill>
+            <a:schemeClr val="accent1">
+              <a:lumMod val="75000"/>
+            </a:schemeClr>
+          </a:solidFill>
+          <a:ln>
+            <a:noFill/>
+          </a:ln>
+        </p:spPr>
+        <p:txBody>
+          <a:bodyPr wrap="square" rtlCol="0">
+            <a:noAutofit/>
+          </a:bodyPr>
+          <a:p>
+            <a:r>
+              <a:rPr lang="zh-CN" altLang="en-US" sz="1600">
+                <a:ln>
+                  <a:noFill/>
+                </a:ln>
+                <a:solidFill>
+                  <a:schemeClr val="bg1"/>
+                </a:solidFill>
+              </a:rPr>
+              <a:t>能量</a:t>
+            </a:r>
+            <a:r>
+              <a:rPr lang="en-US" altLang="zh-CN" sz="1600">
+                <a:ln>
+                  <a:noFill/>
+                </a:ln>
+                <a:solidFill>
+                  <a:schemeClr val="bg1"/>
+                </a:solidFill>
+              </a:rPr>
+              <a:t>                     :       500W</a:t>
+            </a:r>
+            <a:endParaRPr lang="en-US" altLang="zh-CN" sz="1600">
+              <a:ln>
+                <a:noFill/>
+              </a:ln>
+              <a:solidFill>
+                <a:schemeClr val="bg1"/>
+              </a:solidFill>
+            </a:endParaRPr>
+          </a:p>
+        </p:txBody>
+      </p:sp>
+      <p:sp>
+        <p:nvSpPr>
+          <p:cNvPr id="9" name="文本框 8"/>
+          <p:cNvSpPr txBox="1"/>
+          <p:nvPr/>
+        </p:nvSpPr>
+        <p:spPr>
+          <a:xfrm>
+            <a:off x="8107045" y="3325495"/>
+            <a:ext cx="3142615" cy="384175"/>
+          </a:xfrm>
+          <a:prstGeom prst="rect">
+            <a:avLst/>
+          </a:prstGeom>
+          <a:solidFill>
+            <a:schemeClr val="accent1">
+              <a:lumMod val="75000"/>
+            </a:schemeClr>
+          </a:solidFill>
+          <a:ln>
+            <a:noFill/>
+          </a:ln>
+        </p:spPr>
+        <p:txBody>
+          <a:bodyPr wrap="square" rtlCol="0">
+            <a:noAutofit/>
+          </a:bodyPr>
+          <a:p>
+            <a:r>
+              <a:rPr lang="zh-CN" altLang="en-US" sz="1600">
+                <a:ln>
+                  <a:noFill/>
+                </a:ln>
+                <a:solidFill>
+                  <a:schemeClr val="bg1"/>
+                </a:solidFill>
+              </a:rPr>
+              <a:t>新建灯光</a:t>
+            </a:r>
+            <a:r>
+              <a:rPr lang="en-US" altLang="zh-CN" sz="1600">
+                <a:ln>
+                  <a:noFill/>
+                </a:ln>
+                <a:solidFill>
+                  <a:schemeClr val="bg1"/>
+                </a:solidFill>
+              </a:rPr>
+              <a:t>             :                 ...</a:t>
+            </a:r>
+            <a:endParaRPr lang="en-US" altLang="zh-CN" sz="1600">
+              <a:ln>
+                <a:noFill/>
+              </a:ln>
+              <a:solidFill>
+                <a:schemeClr val="bg1"/>
+              </a:solidFill>
+            </a:endParaRPr>
+          </a:p>
+        </p:txBody>
+      </p:sp>
+    </p:spTree>
+  </p:cSld>
+  <p:clrMapOvr>
+    <a:masterClrMapping/>
+  </p:clrMapOvr>
+</p:sld>
+</file>
+
+<file path=ppt/slides/slide7.xml><?xml version="1.0" encoding="utf-8"?>
+<p:sld xmlns:a="http://schemas.openxmlformats.org/drawingml/2006/main" xmlns:r="http://schemas.openxmlformats.org/officeDocument/2006/relationships" xmlns:p="http://schemas.openxmlformats.org/presentationml/2006/main">
+  <p:cSld>
+    <p:spTree>
+      <p:nvGrpSpPr>
+        <p:cNvPr id="1" name=""/>
+        <p:cNvGrpSpPr/>
+        <p:nvPr/>
+      </p:nvGrpSpPr>
+      <p:grpSpPr/>
+      <p:sp>
+        <p:nvSpPr>
+          <p:cNvPr id="2" name="标题 1"/>
+          <p:cNvSpPr>
+            <a:spLocks noGrp="1"/>
+          </p:cNvSpPr>
+          <p:nvPr>
+            <p:ph type="title"/>
+          </p:nvPr>
+        </p:nvSpPr>
+        <p:spPr/>
+        <p:txBody>
+          <a:bodyPr/>
+          <a:p>
+            <a:pPr algn="l"/>
+            <a:r>
+              <a:rPr lang="zh-CN" altLang="en-US" sz="1200" b="1"/>
+              <a:t>说明</a:t>
+            </a:r>
+            <a:br>
+              <a:rPr lang="zh-CN" altLang="en-US" sz="1200"/>
+            </a:br>
+            <a:r>
+              <a:rPr lang="zh-CN" altLang="en-US" sz="1200"/>
+              <a:t>渲染控制可分为：</a:t>
+            </a:r>
+            <a:br>
+              <a:rPr lang="zh-CN" altLang="en-US" sz="1200"/>
+            </a:br>
+            <a:r>
+              <a:rPr lang="en-US" altLang="zh-CN" sz="1200"/>
+              <a:t>	1. </a:t>
+            </a:r>
+            <a:r>
+              <a:rPr lang="zh-CN" altLang="en-US" sz="1200"/>
+              <a:t>材质可编辑</a:t>
+            </a:r>
+            <a:r>
+              <a:rPr lang="en-US" altLang="zh-CN" sz="1200"/>
+              <a:t>/</a:t>
+            </a:r>
+            <a:r>
+              <a:rPr lang="zh-CN" altLang="en-US" sz="1200"/>
+              <a:t>不可编辑</a:t>
+            </a:r>
+            <a:r>
+              <a:rPr lang="en-US" altLang="zh-CN" sz="1200"/>
+              <a:t>(</a:t>
+            </a:r>
+            <a:r>
+              <a:rPr lang="zh-CN" altLang="en-US" sz="1200"/>
+              <a:t>例如某种形式分享出去之后，材质就会整体或者部分不可编辑</a:t>
+            </a:r>
+            <a:r>
+              <a:rPr lang="en-US" altLang="zh-CN" sz="1200"/>
+              <a:t>)</a:t>
+            </a:r>
+            <a:br>
+              <a:rPr lang="zh-CN" altLang="en-US" sz="1200"/>
+            </a:br>
+            <a:r>
+              <a:rPr lang="en-US" altLang="zh-CN" sz="1200"/>
+              <a:t>	2. </a:t>
+            </a:r>
+            <a:r>
+              <a:rPr lang="zh-CN" altLang="en-US" sz="1200"/>
+              <a:t>灯光可编辑</a:t>
+            </a:r>
+            <a:r>
+              <a:rPr lang="en-US" altLang="zh-CN" sz="1200"/>
+              <a:t>/</a:t>
+            </a:r>
+            <a:r>
+              <a:rPr lang="zh-CN" altLang="en-US" sz="1200"/>
+              <a:t>不可编辑</a:t>
+            </a:r>
+            <a:endParaRPr lang="zh-CN" altLang="en-US" sz="1200"/>
+          </a:p>
+        </p:txBody>
+      </p:sp>
+    </p:spTree>
+  </p:cSld>
+  <p:clrMapOvr>
+    <a:masterClrMapping/>
+  </p:clrMapOvr>
+</p:sld>
+</file>
+
+<file path=ppt/slides/slide8.xml><?xml version="1.0" encoding="utf-8"?>
+<p:sld xmlns:a="http://schemas.openxmlformats.org/drawingml/2006/main" xmlns:r="http://schemas.openxmlformats.org/officeDocument/2006/relationships" xmlns:p="http://schemas.openxmlformats.org/presentationml/2006/main">
+  <p:cSld>
+    <p:spTree>
+      <p:nvGrpSpPr>
+        <p:cNvPr id="1" name=""/>
+        <p:cNvGrpSpPr/>
+        <p:nvPr/>
+      </p:nvGrpSpPr>
+      <p:grpSpPr/>
+      <p:graphicFrame>
+        <p:nvGraphicFramePr>
+          <p:cNvPr id="5" name="表格 4"/>
+          <p:cNvGraphicFramePr/>
+          <p:nvPr>
+            <p:custDataLst>
+              <p:tags r:id="rId1"/>
+            </p:custDataLst>
+          </p:nvPr>
+        </p:nvGraphicFramePr>
+        <p:xfrm>
+          <a:off x="708660" y="384810"/>
+          <a:ext cx="10774680" cy="6088380"/>
+        </p:xfrm>
+        <a:graphic>
+          <a:graphicData uri="http://schemas.openxmlformats.org/drawingml/2006/table">
+            <a:tbl>
+              <a:tblPr firstRow="1" bandRow="1">
+                <a:tableStyleId>{5C22544A-7EE6-4342-B048-85BDC9FD1C3A}</a:tableStyleId>
+              </a:tblPr>
+              <a:tblGrid>
+                <a:gridCol w="1795780"/>
+                <a:gridCol w="1795780"/>
+                <a:gridCol w="1795780"/>
+                <a:gridCol w="1795780"/>
+                <a:gridCol w="1795780"/>
+                <a:gridCol w="1795780"/>
+              </a:tblGrid>
+              <a:tr h="1014730">
+                <a:tc>
+                  <a:txBody>
+                    <a:bodyPr/>
+                    <a:p>
+                      <a:pPr algn="ctr">
+                        <a:buNone/>
+                      </a:pPr>
+                      <a:endParaRPr lang="zh-CN" altLang="en-US"/>
+                    </a:p>
+                  </a:txBody>
+                  <a:tcPr anchor="ctr" anchorCtr="0">
+                    <a:solidFill>
+                      <a:schemeClr val="tx2"/>
+                    </a:solidFill>
+                  </a:tcPr>
+                </a:tc>
+                <a:tc>
+                  <a:txBody>
+                    <a:bodyPr/>
+                    <a:p>
+                      <a:pPr algn="ctr">
+                        <a:buNone/>
+                      </a:pPr>
+                      <a:endParaRPr lang="zh-CN" altLang="en-US"/>
+                    </a:p>
+                  </a:txBody>
+                  <a:tcPr anchor="ctr" anchorCtr="0">
+                    <a:solidFill>
+                      <a:schemeClr val="tx2"/>
+                    </a:solidFill>
+                  </a:tcPr>
+                </a:tc>
+                <a:tc>
+                  <a:txBody>
+                    <a:bodyPr/>
+                    <a:p>
+                      <a:pPr algn="ctr">
+                        <a:buNone/>
+                      </a:pPr>
+                      <a:endParaRPr lang="zh-CN" altLang="en-US"/>
+                    </a:p>
+                  </a:txBody>
+                  <a:tcPr anchor="ctr" anchorCtr="0">
+                    <a:solidFill>
+                      <a:schemeClr val="tx2"/>
+                    </a:solidFill>
+                  </a:tcPr>
+                </a:tc>
+                <a:tc>
+                  <a:txBody>
+                    <a:bodyPr/>
+                    <a:p>
+                      <a:pPr algn="ctr">
+                        <a:buNone/>
+                      </a:pPr>
+                      <a:endParaRPr lang="zh-CN" altLang="en-US"/>
+                    </a:p>
+                  </a:txBody>
+                  <a:tcPr anchor="ctr" anchorCtr="0">
+                    <a:solidFill>
+                      <a:schemeClr val="tx2"/>
+                    </a:solidFill>
+                  </a:tcPr>
+                </a:tc>
+                <a:tc>
+                  <a:txBody>
+                    <a:bodyPr/>
+                    <a:p>
+                      <a:pPr algn="ctr">
+                        <a:buNone/>
+                      </a:pPr>
+                      <a:endParaRPr lang="zh-CN" altLang="en-US"/>
+                    </a:p>
+                  </a:txBody>
+                  <a:tcPr anchor="ctr" anchorCtr="0">
+                    <a:solidFill>
+                      <a:schemeClr val="tx2"/>
+                    </a:solidFill>
+                  </a:tcPr>
+                </a:tc>
+                <a:tc>
+                  <a:txBody>
+                    <a:bodyPr/>
+                    <a:p>
+                      <a:pPr algn="ctr">
+                        <a:buNone/>
+                      </a:pPr>
+                      <a:endParaRPr lang="zh-CN" altLang="en-US"/>
+                    </a:p>
+                  </a:txBody>
+                  <a:tcPr anchor="ctr" anchorCtr="0">
+                    <a:solidFill>
+                      <a:schemeClr val="tx2"/>
+                    </a:solidFill>
+                  </a:tcPr>
+                </a:tc>
+              </a:tr>
+              <a:tr h="1014730">
+                <a:tc rowSpan="5" gridSpan="3">
+                  <a:txBody>
+                    <a:bodyPr/>
+                    <a:p>
+                      <a:pPr algn="ctr">
+                        <a:buNone/>
+                      </a:pPr>
+                      <a:endParaRPr lang="zh-CN" altLang="en-US"/>
+                    </a:p>
+                  </a:txBody>
+                  <a:tcPr anchor="ctr" anchorCtr="0"/>
+                </a:tc>
+                <a:tc rowSpan="5" hMerge="1">
+                  <a:tcPr/>
+                </a:tc>
+                <a:tc rowSpan="5" hMerge="1">
+                  <a:tcPr/>
+                </a:tc>
+                <a:tc>
+                  <a:txBody>
+                    <a:bodyPr/>
+                    <a:p>
+                      <a:pPr algn="ctr">
+                        <a:buNone/>
+                      </a:pPr>
+                      <a:r>
+                        <a:rPr lang="zh-CN" altLang="en-US"/>
+                        <a:t>出图设置</a:t>
+                      </a:r>
+                      <a:endParaRPr lang="zh-CN" altLang="en-US"/>
+                    </a:p>
+                  </a:txBody>
+                  <a:tcPr anchor="ctr" anchorCtr="0"/>
+                </a:tc>
+                <a:tc>
+                  <a:txBody>
+                    <a:bodyPr/>
+                    <a:p>
+                      <a:pPr algn="ctr">
+                        <a:buNone/>
+                      </a:pPr>
+                      <a:endParaRPr lang="zh-CN" altLang="en-US"/>
+                    </a:p>
+                  </a:txBody>
+                  <a:tcPr anchor="ctr" anchorCtr="0"/>
+                </a:tc>
+                <a:tc>
+                  <a:txBody>
+                    <a:bodyPr/>
+                    <a:p>
+                      <a:pPr algn="ctr">
+                        <a:buNone/>
+                      </a:pPr>
+                      <a:endParaRPr lang="zh-CN" altLang="en-US"/>
+                    </a:p>
+                  </a:txBody>
+                  <a:tcPr anchor="ctr" anchorCtr="0"/>
+                </a:tc>
+              </a:tr>
+              <a:tr h="1014730">
+                <a:tc vMerge="1" gridSpan="3">
+                  <a:tcPr/>
+                </a:tc>
+                <a:tc vMerge="1" hMerge="1">
+                  <a:tcPr/>
+                </a:tc>
+                <a:tc vMerge="1" hMerge="1">
+                  <a:tcPr/>
+                </a:tc>
+                <a:tc>
+                  <a:txBody>
+                    <a:bodyPr/>
+                    <a:p>
+                      <a:pPr algn="ctr">
+                        <a:buNone/>
+                      </a:pPr>
+                      <a:r>
+                        <a:rPr lang="zh-CN" altLang="en-US"/>
+                        <a:t>环境设置</a:t>
+                      </a:r>
+                      <a:endParaRPr lang="zh-CN" altLang="en-US"/>
+                    </a:p>
+                  </a:txBody>
+                  <a:tcPr anchor="ctr" anchorCtr="0"/>
+                </a:tc>
+                <a:tc>
+                  <a:txBody>
+                    <a:bodyPr/>
+                    <a:p>
+                      <a:pPr algn="ctr">
+                        <a:buNone/>
+                      </a:pPr>
+                      <a:endParaRPr lang="zh-CN" altLang="en-US"/>
+                    </a:p>
+                  </a:txBody>
+                  <a:tcPr anchor="ctr" anchorCtr="0"/>
+                </a:tc>
+                <a:tc>
+                  <a:txBody>
+                    <a:bodyPr/>
+                    <a:p>
+                      <a:pPr algn="ctr">
+                        <a:buNone/>
+                      </a:pPr>
+                      <a:endParaRPr lang="zh-CN" altLang="en-US"/>
+                    </a:p>
+                  </a:txBody>
+                  <a:tcPr anchor="ctr" anchorCtr="0"/>
+                </a:tc>
+              </a:tr>
+              <a:tr h="1014730">
+                <a:tc vMerge="1" gridSpan="3">
+                  <a:tcPr/>
+                </a:tc>
+                <a:tc vMerge="1" hMerge="1">
+                  <a:tcPr/>
+                </a:tc>
+                <a:tc vMerge="1" hMerge="1">
+                  <a:tcPr/>
+                </a:tc>
+                <a:tc>
+                  <a:txBody>
+                    <a:bodyPr/>
+                    <a:p>
+                      <a:pPr algn="ctr">
+                        <a:buNone/>
+                      </a:pPr>
+                      <a:r>
+                        <a:rPr lang="zh-CN" altLang="en-US"/>
+                        <a:t>摄像机</a:t>
+                      </a:r>
+                      <a:endParaRPr lang="zh-CN" altLang="en-US"/>
+                    </a:p>
+                  </a:txBody>
+                  <a:tcPr anchor="ctr" anchorCtr="0"/>
+                </a:tc>
+                <a:tc>
+                  <a:txBody>
+                    <a:bodyPr/>
+                    <a:p>
+                      <a:pPr algn="ctr">
+                        <a:buNone/>
+                      </a:pPr>
+                      <a:endParaRPr lang="zh-CN" altLang="en-US"/>
+                    </a:p>
+                  </a:txBody>
+                  <a:tcPr anchor="ctr" anchorCtr="0"/>
+                </a:tc>
+                <a:tc>
+                  <a:txBody>
+                    <a:bodyPr/>
+                    <a:p>
+                      <a:pPr algn="ctr">
+                        <a:buNone/>
+                      </a:pPr>
+                      <a:endParaRPr lang="zh-CN" altLang="en-US"/>
+                    </a:p>
+                  </a:txBody>
+                  <a:tcPr anchor="ctr" anchorCtr="0"/>
+                </a:tc>
+              </a:tr>
+              <a:tr h="1014730">
+                <a:tc vMerge="1" gridSpan="3">
+                  <a:tcPr/>
+                </a:tc>
+                <a:tc vMerge="1" hMerge="1">
+                  <a:tcPr/>
+                </a:tc>
+                <a:tc vMerge="1" hMerge="1">
+                  <a:tcPr/>
+                </a:tc>
+                <a:tc>
+                  <a:txBody>
+                    <a:bodyPr/>
+                    <a:p>
+                      <a:pPr algn="ctr">
+                        <a:buNone/>
+                      </a:pPr>
+                      <a:r>
+                        <a:rPr lang="zh-CN" altLang="en-US"/>
+                        <a:t>材质</a:t>
+                      </a:r>
+                      <a:endParaRPr lang="zh-CN" altLang="en-US"/>
+                    </a:p>
+                  </a:txBody>
+                  <a:tcPr anchor="ctr" anchorCtr="0"/>
+                </a:tc>
+                <a:tc>
+                  <a:txBody>
+                    <a:bodyPr/>
+                    <a:p>
+                      <a:pPr algn="ctr">
+                        <a:buNone/>
+                      </a:pPr>
+                      <a:endParaRPr lang="zh-CN" altLang="en-US"/>
+                    </a:p>
+                  </a:txBody>
+                  <a:tcPr anchor="ctr" anchorCtr="0"/>
+                </a:tc>
+                <a:tc>
+                  <a:txBody>
+                    <a:bodyPr/>
+                    <a:p>
+                      <a:pPr algn="ctr">
+                        <a:buNone/>
+                      </a:pPr>
+                      <a:endParaRPr lang="zh-CN" altLang="en-US"/>
+                    </a:p>
+                  </a:txBody>
+                  <a:tcPr anchor="ctr" anchorCtr="0"/>
+                </a:tc>
+              </a:tr>
+              <a:tr h="1014730">
+                <a:tc vMerge="1" gridSpan="3">
+                  <a:tcPr/>
+                </a:tc>
+                <a:tc vMerge="1" hMerge="1">
+                  <a:tcPr/>
+                </a:tc>
+                <a:tc vMerge="1" hMerge="1">
+                  <a:tcPr/>
+                </a:tc>
+                <a:tc>
+                  <a:txBody>
+                    <a:bodyPr/>
+                    <a:p>
+                      <a:pPr algn="ctr">
+                        <a:buNone/>
+                      </a:pPr>
+                      <a:r>
+                        <a:rPr lang="zh-CN" altLang="en-US"/>
+                        <a:t>灯光</a:t>
+                      </a:r>
+                      <a:endParaRPr lang="zh-CN" altLang="en-US"/>
+                    </a:p>
+                  </a:txBody>
+                  <a:tcPr anchor="ctr" anchorCtr="0"/>
+                </a:tc>
+                <a:tc>
+                  <a:txBody>
+                    <a:bodyPr/>
+                    <a:p>
+                      <a:pPr algn="ctr">
+                        <a:buNone/>
+                      </a:pPr>
+                      <a:endParaRPr lang="zh-CN" altLang="en-US"/>
+                    </a:p>
+                  </a:txBody>
+                  <a:tcPr anchor="ctr" anchorCtr="0"/>
+                </a:tc>
+                <a:tc>
+                  <a:txBody>
+                    <a:bodyPr/>
+                    <a:p>
+                      <a:pPr algn="ctr">
+                        <a:buNone/>
+                      </a:pPr>
+                      <a:endParaRPr lang="zh-CN" altLang="en-US"/>
+                    </a:p>
+                  </a:txBody>
+                  <a:tcPr anchor="ctr" anchorCtr="0"/>
+                </a:tc>
+              </a:tr>
+            </a:tbl>
+          </a:graphicData>
+        </a:graphic>
+      </p:graphicFrame>
+    </p:spTree>
+  </p:cSld>
+  <p:clrMapOvr>
+    <a:masterClrMapping/>
+  </p:clrMapOvr>
+</p:sld>
+</file>
+
+<file path=ppt/slides/slide9.xml><?xml version="1.0" encoding="utf-8"?>
+<p:sld xmlns:a="http://schemas.openxmlformats.org/drawingml/2006/main" xmlns:r="http://schemas.openxmlformats.org/officeDocument/2006/relationships" xmlns:p="http://schemas.openxmlformats.org/presentationml/2006/main">
+  <p:cSld>
+    <p:spTree>
+      <p:nvGrpSpPr>
+        <p:cNvPr id="1" name=""/>
+        <p:cNvGrpSpPr/>
+        <p:nvPr/>
+      </p:nvGrpSpPr>
+      <p:grpSpPr/>
+      <p:graphicFrame>
+        <p:nvGraphicFramePr>
+          <p:cNvPr id="5" name="表格 4"/>
+          <p:cNvGraphicFramePr/>
+          <p:nvPr>
+            <p:custDataLst>
+              <p:tags r:id="rId1"/>
+            </p:custDataLst>
+          </p:nvPr>
+        </p:nvGraphicFramePr>
+        <p:xfrm>
+          <a:off x="708660" y="384810"/>
+          <a:ext cx="10774680" cy="6088380"/>
+        </p:xfrm>
+        <a:graphic>
+          <a:graphicData uri="http://schemas.openxmlformats.org/drawingml/2006/table">
+            <a:tbl>
+              <a:tblPr firstRow="1" bandRow="1">
+                <a:tableStyleId>{5C22544A-7EE6-4342-B048-85BDC9FD1C3A}</a:tableStyleId>
+              </a:tblPr>
+              <a:tblGrid>
+                <a:gridCol w="1795780"/>
+                <a:gridCol w="1795780"/>
+                <a:gridCol w="1795780"/>
+                <a:gridCol w="1795780"/>
+                <a:gridCol w="1795780"/>
+                <a:gridCol w="1795780"/>
+              </a:tblGrid>
+              <a:tr h="1014730">
+                <a:tc>
+                  <a:txBody>
+                    <a:bodyPr/>
+                    <a:p>
+                      <a:pPr algn="ctr">
+                        <a:buNone/>
+                      </a:pPr>
+                      <a:endParaRPr lang="zh-CN" altLang="en-US"/>
+                    </a:p>
+                  </a:txBody>
+                  <a:tcPr anchor="ctr" anchorCtr="0">
+                    <a:solidFill>
+                      <a:schemeClr val="tx2"/>
+                    </a:solidFill>
+                  </a:tcPr>
+                </a:tc>
+                <a:tc>
+                  <a:txBody>
+                    <a:bodyPr/>
+                    <a:p>
+                      <a:pPr algn="ctr">
+                        <a:buNone/>
+                      </a:pPr>
+                      <a:endParaRPr lang="zh-CN" altLang="en-US"/>
+                    </a:p>
+                  </a:txBody>
+                  <a:tcPr anchor="ctr" anchorCtr="0">
+                    <a:solidFill>
+                      <a:schemeClr val="tx2"/>
+                    </a:solidFill>
+                  </a:tcPr>
+                </a:tc>
+                <a:tc>
+                  <a:txBody>
+                    <a:bodyPr/>
+                    <a:p>
+                      <a:pPr algn="ctr">
+                        <a:buNone/>
+                      </a:pPr>
+                      <a:endParaRPr lang="zh-CN" altLang="en-US"/>
+                    </a:p>
+                  </a:txBody>
+                  <a:tcPr anchor="ctr" anchorCtr="0">
+                    <a:solidFill>
+                      <a:schemeClr val="tx2"/>
+                    </a:solidFill>
+                  </a:tcPr>
+                </a:tc>
+                <a:tc>
+                  <a:txBody>
+                    <a:bodyPr/>
+                    <a:p>
+                      <a:pPr algn="ctr">
+                        <a:buNone/>
+                      </a:pPr>
+                      <a:endParaRPr lang="zh-CN" altLang="en-US"/>
+                    </a:p>
+                  </a:txBody>
+                  <a:tcPr anchor="ctr" anchorCtr="0">
+                    <a:solidFill>
+                      <a:schemeClr val="tx2"/>
+                    </a:solidFill>
+                  </a:tcPr>
+                </a:tc>
+                <a:tc>
+                  <a:txBody>
+                    <a:bodyPr/>
+                    <a:p>
+                      <a:pPr algn="ctr">
+                        <a:buNone/>
+                      </a:pPr>
+                      <a:endParaRPr lang="zh-CN" altLang="en-US"/>
+                    </a:p>
+                  </a:txBody>
+                  <a:tcPr anchor="ctr" anchorCtr="0">
+                    <a:solidFill>
+                      <a:schemeClr val="tx2"/>
+                    </a:solidFill>
+                  </a:tcPr>
+                </a:tc>
+                <a:tc>
+                  <a:txBody>
+                    <a:bodyPr/>
+                    <a:p>
+                      <a:pPr algn="ctr">
+                        <a:buNone/>
+                      </a:pPr>
+                      <a:endParaRPr lang="zh-CN" altLang="en-US"/>
+                    </a:p>
+                  </a:txBody>
+                  <a:tcPr anchor="ctr" anchorCtr="0">
+                    <a:solidFill>
+                      <a:schemeClr val="tx2"/>
+                    </a:solidFill>
+                  </a:tcPr>
+                </a:tc>
+              </a:tr>
+              <a:tr h="1014730">
+                <a:tc rowSpan="5" gridSpan="3">
+                  <a:txBody>
+                    <a:bodyPr/>
+                    <a:p>
+                      <a:pPr algn="ctr">
+                        <a:buNone/>
+                      </a:pPr>
+                      <a:endParaRPr lang="zh-CN" altLang="en-US"/>
+                    </a:p>
+                  </a:txBody>
+                  <a:tcPr anchor="ctr" anchorCtr="0"/>
+                </a:tc>
+                <a:tc rowSpan="5" hMerge="1">
+                  <a:tcPr/>
+                </a:tc>
+                <a:tc rowSpan="5" hMerge="1">
+                  <a:tcPr/>
+                </a:tc>
+                <a:tc>
+                  <a:txBody>
+                    <a:bodyPr/>
+                    <a:p>
+                      <a:pPr algn="ctr">
+                        <a:buNone/>
+                      </a:pPr>
+                      <a:r>
+                        <a:rPr lang="zh-CN" altLang="en-US"/>
+                        <a:t>出图设置</a:t>
+                      </a:r>
+                      <a:endParaRPr lang="zh-CN" altLang="en-US"/>
+                    </a:p>
+                  </a:txBody>
+                  <a:tcPr anchor="ctr" anchorCtr="0">
+                    <a:solidFill>
+                      <a:schemeClr val="accent5">
+                        <a:lumMod val="20000"/>
+                        <a:lumOff val="80000"/>
+                      </a:schemeClr>
+                    </a:solidFill>
+                  </a:tcPr>
+                </a:tc>
+                <a:tc rowSpan="5" gridSpan="2">
+                  <a:txBody>
+                    <a:bodyPr/>
+                    <a:p>
+                      <a:pPr algn="ctr">
+                        <a:buNone/>
+                      </a:pPr>
+                      <a:endParaRPr lang="zh-CN" altLang="en-US"/>
+                    </a:p>
+                  </a:txBody>
+                  <a:tcPr anchor="ctr" anchorCtr="0"/>
+                </a:tc>
+                <a:tc rowSpan="5" hMerge="1">
+                  <a:tcPr anchor="ctr" anchorCtr="0"/>
+                </a:tc>
+              </a:tr>
+              <a:tr h="1014730">
+                <a:tc vMerge="1" gridSpan="3">
+                  <a:tcPr/>
+                </a:tc>
+                <a:tc vMerge="1" hMerge="1">
+                  <a:tcPr/>
+                </a:tc>
+                <a:tc vMerge="1" hMerge="1">
+                  <a:tcPr/>
+                </a:tc>
+                <a:tc>
+                  <a:txBody>
+                    <a:bodyPr/>
+                    <a:p>
+                      <a:pPr algn="ctr">
+                        <a:buNone/>
+                      </a:pPr>
+                      <a:r>
+                        <a:rPr lang="zh-CN" altLang="en-US"/>
+                        <a:t>环境设置</a:t>
+                      </a:r>
+                      <a:endParaRPr lang="zh-CN" altLang="en-US"/>
+                    </a:p>
+                  </a:txBody>
+                  <a:tcPr anchor="ctr" anchorCtr="0">
+                    <a:solidFill>
+                      <a:schemeClr val="accent5">
+                        <a:lumMod val="20000"/>
+                        <a:lumOff val="80000"/>
+                      </a:schemeClr>
+                    </a:solidFill>
+                  </a:tcPr>
+                </a:tc>
+                <a:tc vMerge="1" gridSpan="2">
+                  <a:tcPr anchor="ctr" anchorCtr="0"/>
+                </a:tc>
+                <a:tc vMerge="1" hMerge="1">
+                  <a:tcPr anchor="ctr" anchorCtr="0"/>
+                </a:tc>
+              </a:tr>
+              <a:tr h="1014730">
+                <a:tc vMerge="1" gridSpan="3">
+                  <a:tcPr/>
+                </a:tc>
+                <a:tc vMerge="1" hMerge="1">
+                  <a:tcPr/>
+                </a:tc>
+                <a:tc vMerge="1" hMerge="1">
+                  <a:tcPr/>
+                </a:tc>
+                <a:tc>
+                  <a:txBody>
+                    <a:bodyPr/>
+                    <a:p>
+                      <a:pPr algn="ctr">
+                        <a:buNone/>
+                      </a:pPr>
+                      <a:r>
+                        <a:rPr lang="zh-CN" altLang="en-US"/>
+                        <a:t>摄像机</a:t>
+                      </a:r>
+                      <a:endParaRPr lang="zh-CN" altLang="en-US"/>
+                    </a:p>
+                  </a:txBody>
+                  <a:tcPr anchor="ctr" anchorCtr="0">
+                    <a:solidFill>
+                      <a:schemeClr val="accent5">
+                        <a:lumMod val="20000"/>
+                        <a:lumOff val="80000"/>
+                      </a:schemeClr>
+                    </a:solidFill>
+                  </a:tcPr>
+                </a:tc>
+                <a:tc vMerge="1" gridSpan="2">
+                  <a:tcPr anchor="ctr" anchorCtr="0"/>
+                </a:tc>
+                <a:tc vMerge="1" hMerge="1">
+                  <a:tcPr anchor="ctr" anchorCtr="0"/>
+                </a:tc>
+              </a:tr>
+              <a:tr h="1014730">
+                <a:tc vMerge="1" gridSpan="3">
+                  <a:tcPr/>
+                </a:tc>
+                <a:tc vMerge="1" hMerge="1">
+                  <a:tcPr/>
+                </a:tc>
+                <a:tc vMerge="1" hMerge="1">
+                  <a:tcPr/>
+                </a:tc>
+                <a:tc>
+                  <a:txBody>
+                    <a:bodyPr/>
+                    <a:p>
+                      <a:pPr algn="ctr">
+                        <a:buNone/>
+                      </a:pPr>
+                      <a:r>
+                        <a:rPr lang="zh-CN" altLang="en-US"/>
+                        <a:t>材质</a:t>
+                      </a:r>
+                      <a:endParaRPr lang="zh-CN" altLang="en-US"/>
+                    </a:p>
+                  </a:txBody>
+                  <a:tcPr anchor="ctr" anchorCtr="0">
+                    <a:solidFill>
+                      <a:schemeClr val="accent5">
+                        <a:lumMod val="20000"/>
+                        <a:lumOff val="80000"/>
+                      </a:schemeClr>
+                    </a:solidFill>
+                  </a:tcPr>
+                </a:tc>
+                <a:tc vMerge="1" gridSpan="2">
+                  <a:tcPr anchor="ctr" anchorCtr="0"/>
+                </a:tc>
+                <a:tc vMerge="1" hMerge="1">
+                  <a:tcPr anchor="ctr" anchorCtr="0"/>
+                </a:tc>
+              </a:tr>
+              <a:tr h="1014730">
+                <a:tc vMerge="1" gridSpan="3">
+                  <a:tcPr/>
+                </a:tc>
+                <a:tc vMerge="1" hMerge="1">
+                  <a:tcPr/>
+                </a:tc>
+                <a:tc vMerge="1" hMerge="1">
+                  <a:tcPr/>
+                </a:tc>
+                <a:tc>
+                  <a:txBody>
+                    <a:bodyPr/>
+                    <a:p>
+                      <a:pPr algn="ctr">
+                        <a:buNone/>
+                      </a:pPr>
+                      <a:r>
+                        <a:rPr lang="zh-CN" altLang="en-US"/>
+                        <a:t>灯光</a:t>
+                      </a:r>
+                      <a:endParaRPr lang="zh-CN" altLang="en-US"/>
+                    </a:p>
+                  </a:txBody>
+                  <a:tcPr anchor="ctr" anchorCtr="0">
+                    <a:solidFill>
+                      <a:schemeClr val="accent5">
+                        <a:lumMod val="20000"/>
+                        <a:lumOff val="80000"/>
+                      </a:schemeClr>
+                    </a:solidFill>
+                  </a:tcPr>
+                </a:tc>
+                <a:tc vMerge="1" gridSpan="2">
+                  <a:tcPr anchor="ctr" anchorCtr="0"/>
+                </a:tc>
+                <a:tc vMerge="1" hMerge="1">
+                  <a:tcPr anchor="ctr" anchorCtr="0"/>
+                </a:tc>
+              </a:tr>
+            </a:tbl>
+          </a:graphicData>
+        </a:graphic>
+      </p:graphicFrame>
+      <p:pic>
+        <p:nvPicPr>
+          <p:cNvPr id="2" name="图片 1"/>
+          <p:cNvPicPr>
+            <a:picLocks noChangeAspect="1"/>
+          </p:cNvPicPr>
+          <p:nvPr>
+            <p:custDataLst>
+              <p:tags r:id="rId2"/>
+            </p:custDataLst>
+          </p:nvPr>
+        </p:nvPicPr>
+        <p:blipFill>
+          <a:blip r:embed="rId3"/>
+          <a:stretch>
+            <a:fillRect/>
+          </a:stretch>
+        </p:blipFill>
+        <p:spPr>
+          <a:xfrm>
+            <a:off x="996950" y="1576070"/>
+            <a:ext cx="4773930" cy="4718050"/>
+          </a:xfrm>
+          <a:prstGeom prst="rect">
+            <a:avLst/>
+          </a:prstGeom>
+          <a:effectLst>
+            <a:softEdge rad="50800"/>
+          </a:effectLst>
+        </p:spPr>
+      </p:pic>
     </p:spTree>
   </p:cSld>
   <p:clrMapOvr>
@@ -3358,9 +7361,100 @@
 </p:tagLst>
 </file>
 
+<file path=ppt/tags/tag10.xml><?xml version="1.0" encoding="utf-8"?>
+<p:tagLst xmlns:p="http://schemas.openxmlformats.org/presentationml/2006/main">
+  <p:tag name="KSO_WM_UNIT_TABLE_BEAUTIFY" val="smartTable{78d37a35-130c-4282-be7c-97164b42832d}"/>
+  <p:tag name="TABLE_ENDDRAG_ORIGIN_RECT" val="848*479"/>
+  <p:tag name="TABLE_ENDDRAG_RECT" val="58*35*848*479"/>
+</p:tagLst>
+</file>
+
+<file path=ppt/tags/tag11.xml><?xml version="1.0" encoding="utf-8"?>
+<p:tagLst xmlns:p="http://schemas.openxmlformats.org/presentationml/2006/main">
+  <p:tag name="KSO_WM_BEAUTIFY_FLAG" val=""/>
+</p:tagLst>
+</file>
+
+<file path=ppt/tags/tag12.xml><?xml version="1.0" encoding="utf-8"?>
+<p:tagLst xmlns:p="http://schemas.openxmlformats.org/presentationml/2006/main">
+  <p:tag name="KSO_WM_UNIT_TABLE_BEAUTIFY" val="smartTable{78d37a35-130c-4282-be7c-97164b42832d}"/>
+  <p:tag name="TABLE_ENDDRAG_ORIGIN_RECT" val="848*479"/>
+  <p:tag name="TABLE_ENDDRAG_RECT" val="58*35*848*479"/>
+</p:tagLst>
+</file>
+
+<file path=ppt/tags/tag13.xml><?xml version="1.0" encoding="utf-8"?>
+<p:tagLst xmlns:p="http://schemas.openxmlformats.org/presentationml/2006/main">
+  <p:tag name="KSO_WM_UNIT_TABLE_BEAUTIFY" val="smartTable{78d37a35-130c-4282-be7c-97164b42832d}"/>
+  <p:tag name="TABLE_ENDDRAG_ORIGIN_RECT" val="848*479"/>
+  <p:tag name="TABLE_ENDDRAG_RECT" val="58*35*848*479"/>
+</p:tagLst>
+</file>
+
+<file path=ppt/tags/tag14.xml><?xml version="1.0" encoding="utf-8"?>
+<p:tagLst xmlns:p="http://schemas.openxmlformats.org/presentationml/2006/main">
+  <p:tag name="KSO_WM_BEAUTIFY_FLAG" val=""/>
+</p:tagLst>
+</file>
+
+<file path=ppt/tags/tag15.xml><?xml version="1.0" encoding="utf-8"?>
+<p:tagLst xmlns:p="http://schemas.openxmlformats.org/presentationml/2006/main">
+  <p:tag name="COMMONDATA" val="eyJoZGlkIjoiMDQ3NWUyMzY0ZmQ3NmNkNDlmNWNjYjBiMzg2ZWI4MDkifQ=="/>
+  <p:tag name="KSO_WPP_MARK_KEY" val="d7d03b4c-e402-4805-aa1a-b9c57e6a92af"/>
+</p:tagLst>
+</file>
+
 <file path=ppt/tags/tag2.xml><?xml version="1.0" encoding="utf-8"?>
 <p:tagLst xmlns:p="http://schemas.openxmlformats.org/presentationml/2006/main">
-  <p:tag name="COMMONDATA" val="eyJoZGlkIjoiMDQ3NWUyMzY0ZmQ3NmNkNDlmNWNjYjBiMzg2ZWI4MDkifQ=="/>
+  <p:tag name="KSO_WM_BEAUTIFY_FLAG" val=""/>
+</p:tagLst>
+</file>
+
+<file path=ppt/tags/tag3.xml><?xml version="1.0" encoding="utf-8"?>
+<p:tagLst xmlns:p="http://schemas.openxmlformats.org/presentationml/2006/main">
+  <p:tag name="KSO_WM_BEAUTIFY_FLAG" val=""/>
+</p:tagLst>
+</file>
+
+<file path=ppt/tags/tag4.xml><?xml version="1.0" encoding="utf-8"?>
+<p:tagLst xmlns:p="http://schemas.openxmlformats.org/presentationml/2006/main">
+  <p:tag name="KSO_WM_UNIT_TABLE_BEAUTIFY" val="smartTable{78d37a35-130c-4282-be7c-97164b42832d}"/>
+  <p:tag name="TABLE_ENDDRAG_ORIGIN_RECT" val="848*479"/>
+  <p:tag name="TABLE_ENDDRAG_RECT" val="58*35*848*479"/>
+</p:tagLst>
+</file>
+
+<file path=ppt/tags/tag5.xml><?xml version="1.0" encoding="utf-8"?>
+<p:tagLst xmlns:p="http://schemas.openxmlformats.org/presentationml/2006/main">
+  <p:tag name="KSO_WM_BEAUTIFY_FLAG" val=""/>
+</p:tagLst>
+</file>
+
+<file path=ppt/tags/tag6.xml><?xml version="1.0" encoding="utf-8"?>
+<p:tagLst xmlns:p="http://schemas.openxmlformats.org/presentationml/2006/main">
+  <p:tag name="KSO_WM_UNIT_TABLE_BEAUTIFY" val="smartTable{78d37a35-130c-4282-be7c-97164b42832d}"/>
+  <p:tag name="TABLE_ENDDRAG_ORIGIN_RECT" val="848*479"/>
+  <p:tag name="TABLE_ENDDRAG_RECT" val="58*35*848*479"/>
+</p:tagLst>
+</file>
+
+<file path=ppt/tags/tag7.xml><?xml version="1.0" encoding="utf-8"?>
+<p:tagLst xmlns:p="http://schemas.openxmlformats.org/presentationml/2006/main">
+  <p:tag name="KSO_WM_BEAUTIFY_FLAG" val=""/>
+</p:tagLst>
+</file>
+
+<file path=ppt/tags/tag8.xml><?xml version="1.0" encoding="utf-8"?>
+<p:tagLst xmlns:p="http://schemas.openxmlformats.org/presentationml/2006/main">
+  <p:tag name="KSO_WM_UNIT_TABLE_BEAUTIFY" val="smartTable{78d37a35-130c-4282-be7c-97164b42832d}"/>
+  <p:tag name="TABLE_ENDDRAG_ORIGIN_RECT" val="848*479"/>
+  <p:tag name="TABLE_ENDDRAG_RECT" val="58*35*848*479"/>
+</p:tagLst>
+</file>
+
+<file path=ppt/tags/tag9.xml><?xml version="1.0" encoding="utf-8"?>
+<p:tagLst xmlns:p="http://schemas.openxmlformats.org/presentationml/2006/main">
+  <p:tag name="KSO_WM_BEAUTIFY_FLAG" val=""/>
 </p:tagLst>
 </file>
 

</xml_diff>

<commit_message>
fix: adjust some info.
</commit_message>
<xml_diff>
--- a/src/dsrdiffusion/thinks.pptx
+++ b/src/dsrdiffusion/thinks.pptx
@@ -4361,10 +4361,10 @@
                   <a:schemeClr val="bg1"/>
                 </a:solidFill>
               </a:rPr>
-              <a:t>                  :             </a:t>
-            </a:r>
-            <a:r>
-              <a:rPr lang="zh-CN" altLang="en-US" sz="1600">
+              <a:t>                  :                  </a:t>
+            </a:r>
+            <a:r>
+              <a:rPr lang="en-US" sz="1600">
                 <a:ln>
                   <a:noFill/>
                 </a:ln>
@@ -4372,31 +4372,9 @@
                   <a:schemeClr val="bg1"/>
                 </a:solidFill>
               </a:rPr>
-              <a:t>是</a:t>
-            </a:r>
-            <a:r>
-              <a:rPr lang="en-US" altLang="zh-CN" sz="1600">
-                <a:ln>
-                  <a:noFill/>
-                </a:ln>
-                <a:solidFill>
-                  <a:schemeClr val="bg1"/>
-                </a:solidFill>
-              </a:rPr>
-              <a:t>/</a:t>
-            </a:r>
-            <a:r>
-              <a:rPr lang="zh-CN" altLang="en-US" sz="1600">
-                <a:ln>
-                  <a:noFill/>
-                </a:ln>
-                <a:solidFill>
-                  <a:schemeClr val="bg1"/>
-                </a:solidFill>
-              </a:rPr>
-              <a:t>否</a:t>
-            </a:r>
-            <a:endParaRPr lang="zh-CN" altLang="en-US" sz="1600">
+              <a:t>0</a:t>
+            </a:r>
+            <a:endParaRPr lang="en-US" sz="1600">
               <a:ln>
                 <a:noFill/>
               </a:ln>

</xml_diff>